<commit_message>
Added slides about database
</commit_message>
<xml_diff>
--- a/docs/InstallationCourse.pptx
+++ b/docs/InstallationCourse.pptx
@@ -53,7 +53,13 @@
     <p:sldId id="297" r:id="rId47"/>
     <p:sldId id="298" r:id="rId48"/>
     <p:sldId id="299" r:id="rId49"/>
-    <p:sldId id="300" r:id="rId50"/>
+    <p:sldId id="306" r:id="rId50"/>
+    <p:sldId id="309" r:id="rId51"/>
+    <p:sldId id="300" r:id="rId52"/>
+    <p:sldId id="308" r:id="rId53"/>
+    <p:sldId id="310" r:id="rId54"/>
+    <p:sldId id="311" r:id="rId55"/>
+    <p:sldId id="312" r:id="rId56"/>
   </p:sldIdLst>
   <p:sldSz cx="12192000" cy="6858000"/>
   <p:notesSz cx="6858000" cy="9144000"/>
@@ -289,7 +295,7 @@
           <a:p>
             <a:fld id="{352C0B74-1FE1-4FB7-82E7-0D2FF5E15FE0}" type="datetimeFigureOut">
               <a:rPr lang="nb-NO" smtClean="0"/>
-              <a:t>03.06.2019</a:t>
+              <a:t>06.06.2019</a:t>
             </a:fld>
             <a:endParaRPr lang="nb-NO"/>
           </a:p>
@@ -457,7 +463,7 @@
           <a:p>
             <a:fld id="{352C0B74-1FE1-4FB7-82E7-0D2FF5E15FE0}" type="datetimeFigureOut">
               <a:rPr lang="nb-NO" smtClean="0"/>
-              <a:t>03.06.2019</a:t>
+              <a:t>06.06.2019</a:t>
             </a:fld>
             <a:endParaRPr lang="nb-NO"/>
           </a:p>
@@ -635,7 +641,7 @@
           <a:p>
             <a:fld id="{352C0B74-1FE1-4FB7-82E7-0D2FF5E15FE0}" type="datetimeFigureOut">
               <a:rPr lang="nb-NO" smtClean="0"/>
-              <a:t>03.06.2019</a:t>
+              <a:t>06.06.2019</a:t>
             </a:fld>
             <a:endParaRPr lang="nb-NO"/>
           </a:p>
@@ -803,7 +809,7 @@
           <a:p>
             <a:fld id="{352C0B74-1FE1-4FB7-82E7-0D2FF5E15FE0}" type="datetimeFigureOut">
               <a:rPr lang="nb-NO" smtClean="0"/>
-              <a:t>03.06.2019</a:t>
+              <a:t>06.06.2019</a:t>
             </a:fld>
             <a:endParaRPr lang="nb-NO"/>
           </a:p>
@@ -1048,7 +1054,7 @@
           <a:p>
             <a:fld id="{352C0B74-1FE1-4FB7-82E7-0D2FF5E15FE0}" type="datetimeFigureOut">
               <a:rPr lang="nb-NO" smtClean="0"/>
-              <a:t>03.06.2019</a:t>
+              <a:t>06.06.2019</a:t>
             </a:fld>
             <a:endParaRPr lang="nb-NO"/>
           </a:p>
@@ -1277,7 +1283,7 @@
           <a:p>
             <a:fld id="{352C0B74-1FE1-4FB7-82E7-0D2FF5E15FE0}" type="datetimeFigureOut">
               <a:rPr lang="nb-NO" smtClean="0"/>
-              <a:t>03.06.2019</a:t>
+              <a:t>06.06.2019</a:t>
             </a:fld>
             <a:endParaRPr lang="nb-NO"/>
           </a:p>
@@ -1641,7 +1647,7 @@
           <a:p>
             <a:fld id="{352C0B74-1FE1-4FB7-82E7-0D2FF5E15FE0}" type="datetimeFigureOut">
               <a:rPr lang="nb-NO" smtClean="0"/>
-              <a:t>03.06.2019</a:t>
+              <a:t>06.06.2019</a:t>
             </a:fld>
             <a:endParaRPr lang="nb-NO"/>
           </a:p>
@@ -1758,7 +1764,7 @@
           <a:p>
             <a:fld id="{352C0B74-1FE1-4FB7-82E7-0D2FF5E15FE0}" type="datetimeFigureOut">
               <a:rPr lang="nb-NO" smtClean="0"/>
-              <a:t>03.06.2019</a:t>
+              <a:t>06.06.2019</a:t>
             </a:fld>
             <a:endParaRPr lang="nb-NO"/>
           </a:p>
@@ -1853,7 +1859,7 @@
           <a:p>
             <a:fld id="{352C0B74-1FE1-4FB7-82E7-0D2FF5E15FE0}" type="datetimeFigureOut">
               <a:rPr lang="nb-NO" smtClean="0"/>
-              <a:t>03.06.2019</a:t>
+              <a:t>06.06.2019</a:t>
             </a:fld>
             <a:endParaRPr lang="nb-NO"/>
           </a:p>
@@ -2128,7 +2134,7 @@
           <a:p>
             <a:fld id="{352C0B74-1FE1-4FB7-82E7-0D2FF5E15FE0}" type="datetimeFigureOut">
               <a:rPr lang="nb-NO" smtClean="0"/>
-              <a:t>03.06.2019</a:t>
+              <a:t>06.06.2019</a:t>
             </a:fld>
             <a:endParaRPr lang="nb-NO"/>
           </a:p>
@@ -2380,7 +2386,7 @@
           <a:p>
             <a:fld id="{352C0B74-1FE1-4FB7-82E7-0D2FF5E15FE0}" type="datetimeFigureOut">
               <a:rPr lang="nb-NO" smtClean="0"/>
-              <a:t>03.06.2019</a:t>
+              <a:t>06.06.2019</a:t>
             </a:fld>
             <a:endParaRPr lang="nb-NO"/>
           </a:p>
@@ -2591,7 +2597,7 @@
           <a:p>
             <a:fld id="{352C0B74-1FE1-4FB7-82E7-0D2FF5E15FE0}" type="datetimeFigureOut">
               <a:rPr lang="nb-NO" smtClean="0"/>
-              <a:t>03.06.2019</a:t>
+              <a:t>06.06.2019</a:t>
             </a:fld>
             <a:endParaRPr lang="nb-NO"/>
           </a:p>
@@ -9326,7 +9332,6 @@
               <a:rPr lang="nb-NO" dirty="0"/>
               <a:t>Setup.ps1</a:t>
             </a:r>
-            <a:endParaRPr lang="nb-NO" dirty="0"/>
           </a:p>
         </p:txBody>
       </p:sp>
@@ -9659,6 +9664,22 @@
               <a:rPr lang="nb-NO" dirty="0" err="1" smtClean="0"/>
               <a:t>programpackage</a:t>
             </a:r>
+            <a:r>
+              <a:rPr lang="nb-NO" dirty="0" smtClean="0"/>
+              <a:t> (</a:t>
+            </a:r>
+            <a:r>
+              <a:rPr lang="nb-NO" dirty="0" err="1" smtClean="0"/>
+              <a:t>artifact</a:t>
+            </a:r>
+            <a:r>
+              <a:rPr lang="nb-NO" dirty="0" err="1" smtClean="0"/>
+              <a:t>s</a:t>
+            </a:r>
+            <a:r>
+              <a:rPr lang="nb-NO" dirty="0" smtClean="0"/>
+              <a:t>)</a:t>
+            </a:r>
             <a:endParaRPr lang="nb-NO" dirty="0" smtClean="0"/>
           </a:p>
           <a:p>
@@ -9746,7 +9767,9 @@
         </p:nvSpPr>
         <p:spPr/>
         <p:txBody>
-          <a:bodyPr/>
+          <a:bodyPr>
+            <a:normAutofit lnSpcReduction="10000"/>
+          </a:bodyPr>
           <a:lstStyle/>
           <a:p>
             <a:r>
@@ -9771,6 +9794,14 @@
             </a:r>
             <a:r>
               <a:rPr lang="nb-NO" dirty="0" err="1" smtClean="0"/>
+              <a:t>proprietary</a:t>
+            </a:r>
+            <a:r>
+              <a:rPr lang="nb-NO" dirty="0" smtClean="0"/>
+              <a:t> and </a:t>
+            </a:r>
+            <a:r>
+              <a:rPr lang="nb-NO" dirty="0" err="1" smtClean="0"/>
               <a:t>customized</a:t>
             </a:r>
             <a:r>
@@ -9834,8 +9865,51 @@
             </a:r>
             <a:r>
               <a:rPr lang="nb-NO" dirty="0" smtClean="0"/>
-              <a:t> for database</a:t>
-            </a:r>
+              <a:t> for </a:t>
+            </a:r>
+            <a:r>
+              <a:rPr lang="nb-NO" dirty="0" smtClean="0"/>
+              <a:t>database</a:t>
+            </a:r>
+          </a:p>
+          <a:p>
+            <a:r>
+              <a:rPr lang="nb-NO" dirty="0" smtClean="0"/>
+              <a:t>Chocolatey is </a:t>
+            </a:r>
+            <a:r>
+              <a:rPr lang="nb-NO" dirty="0" err="1" smtClean="0"/>
+              <a:t>intended</a:t>
+            </a:r>
+            <a:r>
+              <a:rPr lang="nb-NO" dirty="0" smtClean="0"/>
+              <a:t> for </a:t>
+            </a:r>
+            <a:r>
+              <a:rPr lang="nb-NO" dirty="0" err="1" smtClean="0"/>
+              <a:t>software</a:t>
+            </a:r>
+            <a:r>
+              <a:rPr lang="nb-NO" dirty="0" smtClean="0"/>
+              <a:t> </a:t>
+            </a:r>
+            <a:r>
+              <a:rPr lang="nb-NO" dirty="0" err="1" smtClean="0"/>
+              <a:t>that</a:t>
+            </a:r>
+            <a:r>
+              <a:rPr lang="nb-NO" dirty="0" smtClean="0"/>
+              <a:t> is </a:t>
+            </a:r>
+            <a:r>
+              <a:rPr lang="nb-NO" dirty="0" err="1" smtClean="0"/>
+              <a:t>installed</a:t>
+            </a:r>
+            <a:r>
+              <a:rPr lang="nb-NO" dirty="0" smtClean="0"/>
+              <a:t> to disk, not database</a:t>
+            </a:r>
+            <a:endParaRPr lang="nb-NO" dirty="0" smtClean="0"/>
           </a:p>
           <a:p>
             <a:r>
@@ -9895,15 +9969,11 @@
             </a:r>
             <a:r>
               <a:rPr lang="nb-NO" dirty="0" smtClean="0"/>
-              <a:t> </a:t>
-            </a:r>
-            <a:r>
-              <a:rPr lang="nb-NO" dirty="0" err="1" smtClean="0"/>
-              <a:t>directly</a:t>
-            </a:r>
-            <a:r>
-              <a:rPr lang="nb-NO" dirty="0" smtClean="0"/>
-              <a:t>. A </a:t>
+              <a:t> to disk. </a:t>
+            </a:r>
+            <a:r>
+              <a:rPr lang="nb-NO" dirty="0" smtClean="0"/>
+              <a:t>A </a:t>
             </a:r>
             <a:r>
               <a:rPr lang="nb-NO" dirty="0" err="1" smtClean="0"/>
@@ -9924,6 +9994,82 @@
             <a:r>
               <a:rPr lang="nb-NO" dirty="0" err="1" smtClean="0"/>
               <a:t>required</a:t>
+            </a:r>
+            <a:r>
+              <a:rPr lang="nb-NO" dirty="0" smtClean="0"/>
+              <a:t> to </a:t>
+            </a:r>
+            <a:r>
+              <a:rPr lang="nb-NO" dirty="0" err="1" smtClean="0"/>
+              <a:t>mirror</a:t>
+            </a:r>
+            <a:r>
+              <a:rPr lang="nb-NO" dirty="0" smtClean="0"/>
+              <a:t> </a:t>
+            </a:r>
+            <a:r>
+              <a:rPr lang="nb-NO" dirty="0" err="1" smtClean="0"/>
+              <a:t>the</a:t>
+            </a:r>
+            <a:r>
+              <a:rPr lang="nb-NO" dirty="0"/>
+              <a:t> </a:t>
+            </a:r>
+            <a:r>
+              <a:rPr lang="nb-NO" dirty="0" err="1" smtClean="0"/>
+              <a:t>packages</a:t>
+            </a:r>
+            <a:r>
+              <a:rPr lang="nb-NO" dirty="0" smtClean="0"/>
+              <a:t> in </a:t>
+            </a:r>
+            <a:r>
+              <a:rPr lang="nb-NO" dirty="0" err="1" smtClean="0"/>
+              <a:t>the</a:t>
+            </a:r>
+            <a:r>
+              <a:rPr lang="nb-NO" dirty="0" smtClean="0"/>
+              <a:t> database to disk so </a:t>
+            </a:r>
+            <a:r>
+              <a:rPr lang="nb-NO" dirty="0" err="1" smtClean="0"/>
+              <a:t>that</a:t>
+            </a:r>
+            <a:r>
+              <a:rPr lang="nb-NO" dirty="0" smtClean="0"/>
+              <a:t> </a:t>
+            </a:r>
+            <a:r>
+              <a:rPr lang="nb-NO" dirty="0" err="1" smtClean="0"/>
+              <a:t>chocolatey</a:t>
+            </a:r>
+            <a:r>
+              <a:rPr lang="nb-NO" dirty="0" smtClean="0"/>
+              <a:t> </a:t>
+            </a:r>
+            <a:r>
+              <a:rPr lang="nb-NO" dirty="0" err="1" smtClean="0"/>
+              <a:t>can</a:t>
+            </a:r>
+            <a:r>
+              <a:rPr lang="nb-NO" dirty="0" smtClean="0"/>
+              <a:t> </a:t>
+            </a:r>
+            <a:r>
+              <a:rPr lang="nb-NO" dirty="0" err="1" smtClean="0"/>
+              <a:t>work</a:t>
+            </a:r>
+            <a:r>
+              <a:rPr lang="nb-NO" dirty="0" smtClean="0"/>
+              <a:t> </a:t>
+            </a:r>
+            <a:r>
+              <a:rPr lang="nb-NO" dirty="0" err="1" smtClean="0"/>
+              <a:t>with</a:t>
+            </a:r>
+            <a:r>
+              <a:rPr lang="nb-NO" dirty="0" smtClean="0"/>
+              <a:t> it.</a:t>
             </a:r>
             <a:endParaRPr lang="nb-NO" dirty="0" smtClean="0"/>
           </a:p>
@@ -10030,11 +10176,127 @@
           <a:p>
             <a:r>
               <a:rPr lang="nb-NO" dirty="0" err="1" smtClean="0"/>
+              <a:t>dips-dbupgrade</a:t>
+            </a:r>
+            <a:r>
+              <a:rPr lang="nb-NO" dirty="0" smtClean="0"/>
+              <a:t> is a </a:t>
+            </a:r>
+            <a:r>
+              <a:rPr lang="nb-NO" dirty="0" err="1" smtClean="0"/>
+              <a:t>chocolateypackage</a:t>
+            </a:r>
+            <a:r>
+              <a:rPr lang="nb-NO" dirty="0" smtClean="0"/>
+              <a:t> </a:t>
+            </a:r>
+            <a:r>
+              <a:rPr lang="nb-NO" dirty="0" err="1" smtClean="0"/>
+              <a:t>that</a:t>
+            </a:r>
+            <a:r>
+              <a:rPr lang="nb-NO" dirty="0" smtClean="0"/>
+              <a:t> </a:t>
+            </a:r>
+            <a:r>
+              <a:rPr lang="nb-NO" dirty="0" err="1" smtClean="0"/>
+              <a:t>installs</a:t>
+            </a:r>
+            <a:r>
+              <a:rPr lang="nb-NO" dirty="0" smtClean="0"/>
+              <a:t> a </a:t>
+            </a:r>
+            <a:r>
+              <a:rPr lang="nb-NO" dirty="0" err="1" smtClean="0"/>
+              <a:t>powershell</a:t>
+            </a:r>
+            <a:r>
+              <a:rPr lang="nb-NO" dirty="0" smtClean="0"/>
+              <a:t> </a:t>
+            </a:r>
+            <a:r>
+              <a:rPr lang="nb-NO" dirty="0" err="1" smtClean="0"/>
+              <a:t>module</a:t>
+            </a:r>
+            <a:r>
+              <a:rPr lang="nb-NO" dirty="0" smtClean="0"/>
+              <a:t> </a:t>
+            </a:r>
+            <a:r>
+              <a:rPr lang="nb-NO" dirty="0" err="1" smtClean="0"/>
+              <a:t>name</a:t>
+            </a:r>
+            <a:r>
+              <a:rPr lang="nb-NO" dirty="0" smtClean="0"/>
+              <a:t> </a:t>
+            </a:r>
+            <a:r>
+              <a:rPr lang="nb-NO" dirty="0" err="1" smtClean="0"/>
+              <a:t>DIPSDBupgrade</a:t>
+            </a:r>
+            <a:r>
+              <a:rPr lang="nb-NO" dirty="0" smtClean="0"/>
+              <a:t>.</a:t>
+            </a:r>
+          </a:p>
+          <a:p>
+            <a:r>
+              <a:rPr lang="nb-NO" dirty="0" smtClean="0"/>
+              <a:t>The </a:t>
+            </a:r>
+            <a:r>
+              <a:rPr lang="nb-NO" dirty="0" err="1" smtClean="0"/>
+              <a:t>module</a:t>
+            </a:r>
+            <a:r>
+              <a:rPr lang="nb-NO" dirty="0" smtClean="0"/>
+              <a:t> </a:t>
+            </a:r>
+            <a:r>
+              <a:rPr lang="nb-NO" dirty="0" err="1" smtClean="0"/>
+              <a:t>contains</a:t>
+            </a:r>
+            <a:r>
+              <a:rPr lang="nb-NO" dirty="0" smtClean="0"/>
+              <a:t> </a:t>
+            </a:r>
+            <a:r>
+              <a:rPr lang="nb-NO" dirty="0" err="1" smtClean="0"/>
+              <a:t>the</a:t>
+            </a:r>
+            <a:r>
+              <a:rPr lang="nb-NO" dirty="0" smtClean="0"/>
+              <a:t> </a:t>
+            </a:r>
+            <a:r>
+              <a:rPr lang="nb-NO" dirty="0" err="1" smtClean="0"/>
+              <a:t>function</a:t>
+            </a:r>
+            <a:r>
+              <a:rPr lang="nb-NO" dirty="0" smtClean="0"/>
+              <a:t>: </a:t>
+            </a:r>
+            <a:r>
+              <a:rPr lang="nb-NO" dirty="0" err="1" smtClean="0"/>
+              <a:t>Install-Databasepackages</a:t>
+            </a:r>
+            <a:endParaRPr lang="nb-NO" dirty="0" smtClean="0"/>
+          </a:p>
+          <a:p>
+            <a:endParaRPr lang="nb-NO" dirty="0"/>
+          </a:p>
+          <a:p>
+            <a:r>
+              <a:rPr lang="nb-NO" dirty="0" err="1" smtClean="0"/>
               <a:t>Install-DatabasePackages</a:t>
             </a:r>
             <a:r>
               <a:rPr lang="nb-NO" dirty="0" smtClean="0"/>
-              <a:t> –</a:t>
+              <a:t> </a:t>
+            </a:r>
+            <a:r>
+              <a:rPr lang="nb-NO" dirty="0" smtClean="0"/>
+              <a:t>–</a:t>
             </a:r>
             <a:r>
               <a:rPr lang="nb-NO" dirty="0" err="1" smtClean="0"/>
@@ -10487,7 +10749,7 @@
             </a:r>
             <a:r>
               <a:rPr lang="nb-NO" dirty="0" smtClean="0"/>
-              <a:t>\</a:t>
+              <a:t>\database-date-time\</a:t>
             </a:r>
             <a:r>
               <a:rPr lang="nb-NO" dirty="0" err="1" smtClean="0"/>
@@ -10597,7 +10859,9 @@
         </p:nvSpPr>
         <p:spPr/>
         <p:txBody>
-          <a:bodyPr/>
+          <a:bodyPr>
+            <a:normAutofit/>
+          </a:bodyPr>
           <a:lstStyle/>
           <a:p>
             <a:pPr marL="514350" indent="-514350">
@@ -10629,31 +10893,23 @@
               <a:t> :$</a:t>
             </a:r>
             <a:r>
-              <a:rPr lang="nb-NO" dirty="0" err="1"/>
+              <a:rPr lang="nb-NO" dirty="0" err="1" smtClean="0"/>
               <a:t>InstallDir</a:t>
             </a:r>
             <a:r>
-              <a:rPr lang="nb-NO" dirty="0"/>
+              <a:rPr lang="nb-NO" dirty="0" smtClean="0"/>
+              <a:t>\database-date-time\</a:t>
+            </a:r>
+            <a:r>
+              <a:rPr lang="nb-NO" dirty="0" err="1" smtClean="0"/>
+              <a:t>choco</a:t>
+            </a:r>
+            <a:r>
+              <a:rPr lang="nb-NO" dirty="0" smtClean="0"/>
               <a:t>\</a:t>
             </a:r>
             <a:r>
-              <a:rPr lang="nb-NO" dirty="0" err="1"/>
-              <a:t>choco</a:t>
-            </a:r>
-            <a:r>
-              <a:rPr lang="nb-NO" dirty="0"/>
-              <a:t>\</a:t>
-            </a:r>
-            <a:r>
-              <a:rPr lang="nb-NO" dirty="0" err="1"/>
-              <a:t>chocolatey</a:t>
-            </a:r>
-            <a:r>
-              <a:rPr lang="nb-NO" dirty="0"/>
-              <a:t>\</a:t>
-            </a:r>
-            <a:r>
-              <a:rPr lang="nb-NO" dirty="0" err="1"/>
+              <a:rPr lang="nb-NO" dirty="0" err="1" smtClean="0"/>
               <a:t>lib</a:t>
             </a:r>
             <a:endParaRPr lang="nb-NO" dirty="0"/>
@@ -10689,14 +10945,7 @@
             </a:r>
           </a:p>
           <a:p>
-            <a:pPr marL="971550" lvl="1" indent="-514350">
-              <a:buFont typeface="+mj-lt"/>
-              <a:buAutoNum type="arabicPeriod" startAt="7"/>
-            </a:pPr>
-            <a:r>
-              <a:rPr lang="nb-NO" dirty="0" smtClean="0"/>
-              <a:t> </a:t>
-            </a:r>
+            <a:pPr lvl="1"/>
             <a:r>
               <a:rPr lang="nb-NO" dirty="0" err="1" smtClean="0"/>
               <a:t>installed</a:t>
@@ -10737,12 +10986,10 @@
               <a:rPr lang="nb-NO" dirty="0" smtClean="0"/>
               <a:t> </a:t>
             </a:r>
-          </a:p>
-          <a:p>
-            <a:pPr marL="971550" lvl="1" indent="-514350">
-              <a:buFont typeface="+mj-lt"/>
-              <a:buAutoNum type="arabicPeriod" startAt="7"/>
-            </a:pPr>
+            <a:endParaRPr lang="nb-NO" dirty="0" smtClean="0"/>
+          </a:p>
+          <a:p>
+            <a:pPr lvl="1"/>
             <a:r>
               <a:rPr lang="nb-NO" dirty="0" err="1" smtClean="0"/>
               <a:t>written</a:t>
@@ -10767,12 +11014,10 @@
               <a:rPr lang="nb-NO" dirty="0" smtClean="0"/>
               <a:t>\moduleOrder.txt</a:t>
             </a:r>
-          </a:p>
-          <a:p>
-            <a:pPr marL="971550" lvl="1" indent="-514350">
-              <a:buFont typeface="+mj-lt"/>
-              <a:buAutoNum type="arabicPeriod" startAt="7"/>
-            </a:pPr>
+            <a:endParaRPr lang="nb-NO" dirty="0" smtClean="0"/>
+          </a:p>
+          <a:p>
+            <a:pPr lvl="1"/>
             <a:r>
               <a:rPr lang="nb-NO" dirty="0" err="1" smtClean="0"/>
               <a:t>copied</a:t>
@@ -10802,15 +11047,15 @@
               <a:t>$</a:t>
             </a:r>
             <a:r>
-              <a:rPr lang="nb-NO" dirty="0" err="1"/>
+              <a:rPr lang="nb-NO" dirty="0" err="1" smtClean="0"/>
               <a:t>InstallDir</a:t>
             </a:r>
             <a:r>
-              <a:rPr lang="nb-NO" dirty="0"/>
+              <a:rPr lang="nb-NO" dirty="0" smtClean="0"/>
               <a:t>\</a:t>
             </a:r>
             <a:r>
-              <a:rPr lang="nb-NO" dirty="0" err="1"/>
+              <a:rPr lang="nb-NO" dirty="0" err="1" smtClean="0"/>
               <a:t>json</a:t>
             </a:r>
             <a:r>
@@ -11377,19 +11622,19 @@
           <a:lstStyle/>
           <a:p>
             <a:r>
-              <a:rPr lang="nb-NO" dirty="0" smtClean="0"/>
+              <a:rPr lang="nb-NO" dirty="0"/>
               <a:t>Database </a:t>
             </a:r>
             <a:r>
-              <a:rPr lang="nb-NO" dirty="0" err="1" smtClean="0"/>
+              <a:rPr lang="nb-NO" dirty="0" err="1"/>
               <a:t>package</a:t>
             </a:r>
             <a:r>
-              <a:rPr lang="nb-NO" dirty="0" smtClean="0"/>
-              <a:t> </a:t>
-            </a:r>
-            <a:r>
-              <a:rPr lang="nb-NO" dirty="0" err="1" smtClean="0"/>
+              <a:rPr lang="nb-NO" dirty="0"/>
+              <a:t> </a:t>
+            </a:r>
+            <a:r>
+              <a:rPr lang="nb-NO" dirty="0" err="1"/>
               <a:t>versioning</a:t>
             </a:r>
             <a:endParaRPr lang="nb-NO" dirty="0"/>
@@ -11411,111 +11656,302 @@
           <a:bodyPr/>
           <a:lstStyle/>
           <a:p>
-            <a:pPr marL="0" indent="0">
-              <a:buNone/>
-            </a:pPr>
-            <a:r>
-              <a:rPr lang="nb-NO" dirty="0" smtClean="0"/>
-              <a:t>To separate </a:t>
-            </a:r>
-            <a:r>
-              <a:rPr lang="nb-NO" dirty="0" err="1" smtClean="0"/>
-              <a:t>we</a:t>
-            </a:r>
-            <a:r>
-              <a:rPr lang="nb-NO" dirty="0" smtClean="0"/>
-              <a:t> </a:t>
-            </a:r>
-            <a:r>
-              <a:rPr lang="nb-NO" dirty="0" err="1" smtClean="0"/>
-              <a:t>can</a:t>
-            </a:r>
-            <a:r>
-              <a:rPr lang="nb-NO" dirty="0" smtClean="0"/>
-              <a:t> </a:t>
-            </a:r>
-            <a:r>
-              <a:rPr lang="nb-NO" dirty="0" err="1" smtClean="0"/>
-              <a:t>use</a:t>
-            </a:r>
-            <a:r>
-              <a:rPr lang="nb-NO" dirty="0" smtClean="0"/>
-              <a:t> </a:t>
-            </a:r>
-            <a:r>
-              <a:rPr lang="nb-NO" dirty="0" err="1" smtClean="0"/>
-              <a:t>programversion</a:t>
-            </a:r>
-            <a:r>
-              <a:rPr lang="nb-NO" dirty="0" smtClean="0"/>
-              <a:t> and </a:t>
-            </a:r>
-            <a:r>
-              <a:rPr lang="nb-NO" dirty="0" err="1" smtClean="0"/>
-              <a:t>nugetversion</a:t>
-            </a:r>
-            <a:endParaRPr lang="nb-NO" dirty="0" smtClean="0"/>
-          </a:p>
-          <a:p>
-            <a:pPr marL="0" indent="0">
-              <a:buNone/>
-            </a:pPr>
-            <a:endParaRPr lang="nb-NO" dirty="0" smtClean="0"/>
-          </a:p>
-          <a:p>
-            <a:pPr marL="0" indent="0">
-              <a:buNone/>
-            </a:pPr>
-            <a:r>
-              <a:rPr lang="nb-NO" dirty="0" smtClean="0"/>
-              <a:t>Id: </a:t>
-            </a:r>
-            <a:r>
-              <a:rPr lang="nb-NO" dirty="0" err="1" smtClean="0"/>
-              <a:t>dipa</a:t>
-            </a:r>
-            <a:r>
-              <a:rPr lang="nb-NO" dirty="0" smtClean="0"/>
-              <a:t>-arena-</a:t>
-            </a:r>
-            <a:r>
-              <a:rPr lang="nb-NO" dirty="0" err="1" smtClean="0"/>
-              <a:t>programpackage</a:t>
-            </a:r>
-            <a:r>
-              <a:rPr lang="nb-NO" dirty="0" smtClean="0"/>
-              <a:t>-database-$</a:t>
-            </a:r>
-            <a:r>
-              <a:rPr lang="nb-NO" dirty="0" err="1" smtClean="0"/>
-              <a:t>programversion</a:t>
-            </a:r>
-            <a:endParaRPr lang="nb-NO" dirty="0" smtClean="0"/>
-          </a:p>
-          <a:p>
-            <a:pPr marL="0" indent="0">
-              <a:buNone/>
-            </a:pPr>
-            <a:r>
-              <a:rPr lang="nb-NO" dirty="0" smtClean="0"/>
-              <a:t>Version: $</a:t>
-            </a:r>
-            <a:r>
-              <a:rPr lang="nb-NO" dirty="0" err="1" smtClean="0"/>
-              <a:t>nugetversion</a:t>
-            </a:r>
-            <a:endParaRPr lang="nb-NO" dirty="0" smtClean="0"/>
-          </a:p>
-          <a:p>
-            <a:pPr marL="0" indent="0">
-              <a:buNone/>
-            </a:pPr>
-            <a:endParaRPr lang="nb-NO" dirty="0"/>
-          </a:p>
-          <a:p>
-            <a:pPr marL="0" indent="0">
-              <a:buNone/>
-            </a:pPr>
+            <a:r>
+              <a:rPr lang="nb-NO" dirty="0" err="1" smtClean="0"/>
+              <a:t>Unlike</a:t>
+            </a:r>
+            <a:r>
+              <a:rPr lang="nb-NO" dirty="0" smtClean="0"/>
+              <a:t> server and </a:t>
+            </a:r>
+            <a:r>
+              <a:rPr lang="nb-NO" dirty="0" err="1" smtClean="0"/>
+              <a:t>client</a:t>
+            </a:r>
+            <a:r>
+              <a:rPr lang="nb-NO" dirty="0" smtClean="0"/>
+              <a:t>, </a:t>
+            </a:r>
+            <a:r>
+              <a:rPr lang="nb-NO" dirty="0" err="1" smtClean="0"/>
+              <a:t>which</a:t>
+            </a:r>
+            <a:r>
+              <a:rPr lang="nb-NO" dirty="0" smtClean="0"/>
+              <a:t> </a:t>
+            </a:r>
+            <a:r>
+              <a:rPr lang="nb-NO" dirty="0" err="1" smtClean="0"/>
+              <a:t>are</a:t>
+            </a:r>
+            <a:r>
+              <a:rPr lang="nb-NO" dirty="0" smtClean="0"/>
+              <a:t> </a:t>
+            </a:r>
+            <a:r>
+              <a:rPr lang="nb-NO" dirty="0" err="1" smtClean="0"/>
+              <a:t>replaced</a:t>
+            </a:r>
+            <a:r>
+              <a:rPr lang="nb-NO" dirty="0" smtClean="0"/>
+              <a:t> </a:t>
+            </a:r>
+            <a:r>
+              <a:rPr lang="nb-NO" dirty="0" err="1" smtClean="0"/>
+              <a:t>when</a:t>
+            </a:r>
+            <a:r>
+              <a:rPr lang="nb-NO" dirty="0" smtClean="0"/>
+              <a:t> a </a:t>
+            </a:r>
+            <a:r>
+              <a:rPr lang="nb-NO" dirty="0" err="1" smtClean="0"/>
+              <a:t>new</a:t>
+            </a:r>
+            <a:r>
+              <a:rPr lang="nb-NO" dirty="0" smtClean="0"/>
+              <a:t> </a:t>
+            </a:r>
+            <a:r>
+              <a:rPr lang="nb-NO" dirty="0" err="1" smtClean="0"/>
+              <a:t>version</a:t>
+            </a:r>
+            <a:r>
+              <a:rPr lang="nb-NO" dirty="0" smtClean="0"/>
+              <a:t> is </a:t>
+            </a:r>
+            <a:r>
+              <a:rPr lang="nb-NO" dirty="0" err="1" smtClean="0"/>
+              <a:t>installed</a:t>
+            </a:r>
+            <a:r>
+              <a:rPr lang="nb-NO" dirty="0" smtClean="0"/>
+              <a:t>, database is </a:t>
+            </a:r>
+            <a:r>
+              <a:rPr lang="nb-NO" dirty="0" err="1" smtClean="0"/>
+              <a:t>upgraded</a:t>
+            </a:r>
+            <a:r>
+              <a:rPr lang="nb-NO" dirty="0" smtClean="0"/>
+              <a:t> by </a:t>
+            </a:r>
+            <a:r>
+              <a:rPr lang="nb-NO" dirty="0" err="1" smtClean="0"/>
+              <a:t>running</a:t>
+            </a:r>
+            <a:r>
+              <a:rPr lang="nb-NO" dirty="0" smtClean="0"/>
+              <a:t> </a:t>
+            </a:r>
+            <a:r>
+              <a:rPr lang="nb-NO" dirty="0" err="1" smtClean="0"/>
+              <a:t>sqls</a:t>
+            </a:r>
+            <a:r>
+              <a:rPr lang="nb-NO" dirty="0" smtClean="0"/>
+              <a:t> </a:t>
+            </a:r>
+            <a:r>
+              <a:rPr lang="nb-NO" dirty="0" err="1" smtClean="0"/>
+              <a:t>on</a:t>
+            </a:r>
+            <a:r>
+              <a:rPr lang="nb-NO" dirty="0" smtClean="0"/>
+              <a:t> </a:t>
+            </a:r>
+            <a:r>
+              <a:rPr lang="nb-NO" dirty="0" err="1" smtClean="0"/>
+              <a:t>the</a:t>
+            </a:r>
+            <a:r>
+              <a:rPr lang="nb-NO" dirty="0" smtClean="0"/>
+              <a:t> database. </a:t>
+            </a:r>
+          </a:p>
+          <a:p>
+            <a:r>
+              <a:rPr lang="nb-NO" dirty="0" err="1" smtClean="0"/>
+              <a:t>Each</a:t>
+            </a:r>
+            <a:r>
+              <a:rPr lang="nb-NO" dirty="0" smtClean="0"/>
+              <a:t> database </a:t>
+            </a:r>
+            <a:r>
+              <a:rPr lang="nb-NO" dirty="0" err="1" smtClean="0"/>
+              <a:t>package</a:t>
+            </a:r>
+            <a:r>
+              <a:rPr lang="nb-NO" dirty="0"/>
+              <a:t> </a:t>
+            </a:r>
+            <a:r>
+              <a:rPr lang="nb-NO" dirty="0" err="1" smtClean="0"/>
+              <a:t>contains</a:t>
+            </a:r>
+            <a:r>
+              <a:rPr lang="nb-NO" dirty="0" smtClean="0"/>
+              <a:t> </a:t>
+            </a:r>
+            <a:r>
+              <a:rPr lang="nb-NO" dirty="0" err="1" smtClean="0"/>
+              <a:t>only</a:t>
+            </a:r>
+            <a:r>
+              <a:rPr lang="nb-NO" dirty="0" smtClean="0"/>
+              <a:t> </a:t>
+            </a:r>
+            <a:r>
+              <a:rPr lang="nb-NO" dirty="0" err="1" smtClean="0"/>
+              <a:t>the</a:t>
+            </a:r>
+            <a:r>
+              <a:rPr lang="nb-NO" dirty="0" smtClean="0"/>
+              <a:t> </a:t>
+            </a:r>
+            <a:r>
+              <a:rPr lang="nb-NO" dirty="0" err="1" smtClean="0"/>
+              <a:t>sql</a:t>
+            </a:r>
+            <a:r>
+              <a:rPr lang="nb-NO" dirty="0" smtClean="0"/>
+              <a:t> (</a:t>
+            </a:r>
+            <a:r>
+              <a:rPr lang="nb-NO" dirty="0" err="1" smtClean="0"/>
+              <a:t>dupfiles</a:t>
+            </a:r>
+            <a:r>
+              <a:rPr lang="nb-NO" dirty="0" smtClean="0"/>
+              <a:t>) to </a:t>
+            </a:r>
+            <a:r>
+              <a:rPr lang="nb-NO" dirty="0" err="1" smtClean="0"/>
+              <a:t>upgrade</a:t>
+            </a:r>
+            <a:r>
+              <a:rPr lang="nb-NO" dirty="0" smtClean="0"/>
+              <a:t> from </a:t>
+            </a:r>
+            <a:r>
+              <a:rPr lang="nb-NO" dirty="0" err="1" smtClean="0"/>
+              <a:t>one</a:t>
+            </a:r>
+            <a:r>
+              <a:rPr lang="nb-NO" dirty="0" smtClean="0"/>
+              <a:t> </a:t>
+            </a:r>
+            <a:r>
+              <a:rPr lang="nb-NO" dirty="0" err="1" smtClean="0"/>
+              <a:t>version</a:t>
+            </a:r>
+            <a:r>
+              <a:rPr lang="nb-NO" dirty="0" smtClean="0"/>
+              <a:t> to </a:t>
+            </a:r>
+            <a:r>
+              <a:rPr lang="nb-NO" dirty="0" err="1" smtClean="0"/>
+              <a:t>the</a:t>
+            </a:r>
+            <a:r>
+              <a:rPr lang="nb-NO" dirty="0" smtClean="0"/>
+              <a:t> </a:t>
+            </a:r>
+            <a:r>
+              <a:rPr lang="nb-NO" dirty="0" err="1" smtClean="0"/>
+              <a:t>next</a:t>
+            </a:r>
+            <a:r>
+              <a:rPr lang="nb-NO" dirty="0" smtClean="0"/>
+              <a:t>. Not </a:t>
+            </a:r>
+            <a:r>
+              <a:rPr lang="nb-NO" dirty="0" err="1" smtClean="0"/>
+              <a:t>sqls</a:t>
+            </a:r>
+            <a:r>
+              <a:rPr lang="nb-NO" dirty="0" smtClean="0"/>
+              <a:t> to </a:t>
+            </a:r>
+            <a:r>
+              <a:rPr lang="nb-NO" dirty="0" err="1" smtClean="0"/>
+              <a:t>upgrade</a:t>
+            </a:r>
+            <a:r>
+              <a:rPr lang="nb-NO" dirty="0" smtClean="0"/>
+              <a:t> from an </a:t>
+            </a:r>
+            <a:r>
+              <a:rPr lang="nb-NO" dirty="0" err="1" smtClean="0"/>
+              <a:t>empty</a:t>
+            </a:r>
+            <a:r>
+              <a:rPr lang="nb-NO" dirty="0" smtClean="0"/>
+              <a:t> database.</a:t>
+            </a:r>
+          </a:p>
+          <a:p>
+            <a:r>
+              <a:rPr lang="nb-NO" dirty="0" smtClean="0"/>
+              <a:t>The </a:t>
+            </a:r>
+            <a:r>
+              <a:rPr lang="nb-NO" dirty="0" err="1" smtClean="0"/>
+              <a:t>package</a:t>
+            </a:r>
+            <a:r>
+              <a:rPr lang="nb-NO" dirty="0" smtClean="0"/>
+              <a:t> has a </a:t>
+            </a:r>
+            <a:r>
+              <a:rPr lang="nb-NO" dirty="0" err="1" smtClean="0"/>
+              <a:t>dependency</a:t>
+            </a:r>
+            <a:r>
+              <a:rPr lang="nb-NO" dirty="0" smtClean="0"/>
+              <a:t> to </a:t>
+            </a:r>
+            <a:r>
+              <a:rPr lang="nb-NO" dirty="0" err="1" smtClean="0"/>
+              <a:t>the</a:t>
+            </a:r>
+            <a:r>
+              <a:rPr lang="nb-NO" dirty="0" smtClean="0"/>
+              <a:t> </a:t>
+            </a:r>
+            <a:r>
+              <a:rPr lang="nb-NO" dirty="0" err="1" smtClean="0"/>
+              <a:t>package</a:t>
+            </a:r>
+            <a:r>
+              <a:rPr lang="nb-NO" dirty="0" smtClean="0"/>
+              <a:t> for </a:t>
+            </a:r>
+            <a:r>
+              <a:rPr lang="nb-NO" dirty="0" err="1" smtClean="0"/>
+              <a:t>the</a:t>
+            </a:r>
+            <a:r>
+              <a:rPr lang="nb-NO" dirty="0" smtClean="0"/>
+              <a:t> </a:t>
+            </a:r>
+            <a:r>
+              <a:rPr lang="nb-NO" dirty="0" err="1" smtClean="0"/>
+              <a:t>previous</a:t>
+            </a:r>
+            <a:r>
+              <a:rPr lang="nb-NO" dirty="0" smtClean="0"/>
+              <a:t> </a:t>
+            </a:r>
+            <a:r>
+              <a:rPr lang="nb-NO" dirty="0" err="1" smtClean="0"/>
+              <a:t>version</a:t>
+            </a:r>
+            <a:r>
+              <a:rPr lang="nb-NO" dirty="0" smtClean="0"/>
+              <a:t>.</a:t>
+            </a:r>
             <a:endParaRPr lang="nb-NO" dirty="0"/>
           </a:p>
         </p:txBody>
@@ -11523,7 +11959,7 @@
     </p:spTree>
     <p:extLst>
       <p:ext uri="{BB962C8B-B14F-4D97-AF65-F5344CB8AC3E}">
-        <p14:creationId xmlns:p14="http://schemas.microsoft.com/office/powerpoint/2010/main" val="1321381453"/>
+        <p14:creationId xmlns:p14="http://schemas.microsoft.com/office/powerpoint/2010/main" val="2526172106"/>
       </p:ext>
     </p:extLst>
   </p:cSld>
@@ -11807,6 +12243,1889 @@
 </p:sld>
 </file>
 
+<file path=ppt/slides/slide50.xml><?xml version="1.0" encoding="utf-8"?>
+<p:sld xmlns:a="http://schemas.openxmlformats.org/drawingml/2006/main" xmlns:r="http://schemas.openxmlformats.org/officeDocument/2006/relationships" xmlns:p="http://schemas.openxmlformats.org/presentationml/2006/main">
+  <p:cSld>
+    <p:spTree>
+      <p:nvGrpSpPr>
+        <p:cNvPr id="1" name=""/>
+        <p:cNvGrpSpPr/>
+        <p:nvPr/>
+      </p:nvGrpSpPr>
+      <p:grpSpPr>
+        <a:xfrm>
+          <a:off x="0" y="0"/>
+          <a:ext cx="0" cy="0"/>
+          <a:chOff x="0" y="0"/>
+          <a:chExt cx="0" cy="0"/>
+        </a:xfrm>
+      </p:grpSpPr>
+      <p:sp>
+        <p:nvSpPr>
+          <p:cNvPr id="2" name="Title 1"/>
+          <p:cNvSpPr>
+            <a:spLocks noGrp="1"/>
+          </p:cNvSpPr>
+          <p:nvPr>
+            <p:ph type="title"/>
+          </p:nvPr>
+        </p:nvSpPr>
+        <p:spPr/>
+        <p:txBody>
+          <a:bodyPr/>
+          <a:lstStyle/>
+          <a:p>
+            <a:r>
+              <a:rPr lang="nb-NO" dirty="0" smtClean="0"/>
+              <a:t>Database </a:t>
+            </a:r>
+            <a:r>
+              <a:rPr lang="nb-NO" dirty="0" err="1" smtClean="0"/>
+              <a:t>package</a:t>
+            </a:r>
+            <a:r>
+              <a:rPr lang="nb-NO" dirty="0" smtClean="0"/>
+              <a:t> </a:t>
+            </a:r>
+            <a:r>
+              <a:rPr lang="nb-NO" dirty="0" err="1" smtClean="0"/>
+              <a:t>versioning</a:t>
+            </a:r>
+            <a:endParaRPr lang="nb-NO" dirty="0"/>
+          </a:p>
+        </p:txBody>
+      </p:sp>
+      <p:sp>
+        <p:nvSpPr>
+          <p:cNvPr id="3" name="Content Placeholder 2"/>
+          <p:cNvSpPr>
+            <a:spLocks noGrp="1"/>
+          </p:cNvSpPr>
+          <p:nvPr>
+            <p:ph idx="1"/>
+          </p:nvPr>
+        </p:nvSpPr>
+        <p:spPr/>
+        <p:txBody>
+          <a:bodyPr/>
+          <a:lstStyle/>
+          <a:p>
+            <a:endParaRPr lang="nb-NO" dirty="0" smtClean="0"/>
+          </a:p>
+          <a:p>
+            <a:pPr marL="0" indent="0">
+              <a:buNone/>
+            </a:pPr>
+            <a:endParaRPr lang="nb-NO" dirty="0"/>
+          </a:p>
+        </p:txBody>
+      </p:sp>
+      <p:pic>
+        <p:nvPicPr>
+          <p:cNvPr id="4" name="Picture 3"/>
+          <p:cNvPicPr>
+            <a:picLocks noChangeAspect="1"/>
+          </p:cNvPicPr>
+          <p:nvPr/>
+        </p:nvPicPr>
+        <p:blipFill>
+          <a:blip r:embed="rId2">
+            <a:extLst>
+              <a:ext uri="{28A0092B-C50C-407E-A947-70E740481C1C}">
+                <a14:useLocalDpi xmlns:a14="http://schemas.microsoft.com/office/drawing/2010/main" val="0"/>
+              </a:ext>
+            </a:extLst>
+          </a:blip>
+          <a:stretch>
+            <a:fillRect/>
+          </a:stretch>
+        </p:blipFill>
+        <p:spPr>
+          <a:xfrm>
+            <a:off x="3525029" y="1542877"/>
+            <a:ext cx="2712115" cy="4634086"/>
+          </a:xfrm>
+          <a:prstGeom prst="rect">
+            <a:avLst/>
+          </a:prstGeom>
+        </p:spPr>
+      </p:pic>
+    </p:spTree>
+    <p:extLst>
+      <p:ext uri="{BB962C8B-B14F-4D97-AF65-F5344CB8AC3E}">
+        <p14:creationId xmlns:p14="http://schemas.microsoft.com/office/powerpoint/2010/main" val="1730602914"/>
+      </p:ext>
+    </p:extLst>
+  </p:cSld>
+  <p:clrMapOvr>
+    <a:masterClrMapping/>
+  </p:clrMapOvr>
+</p:sld>
+</file>
+
+<file path=ppt/slides/slide51.xml><?xml version="1.0" encoding="utf-8"?>
+<p:sld xmlns:a="http://schemas.openxmlformats.org/drawingml/2006/main" xmlns:r="http://schemas.openxmlformats.org/officeDocument/2006/relationships" xmlns:p="http://schemas.openxmlformats.org/presentationml/2006/main">
+  <p:cSld>
+    <p:spTree>
+      <p:nvGrpSpPr>
+        <p:cNvPr id="1" name=""/>
+        <p:cNvGrpSpPr/>
+        <p:nvPr/>
+      </p:nvGrpSpPr>
+      <p:grpSpPr>
+        <a:xfrm>
+          <a:off x="0" y="0"/>
+          <a:ext cx="0" cy="0"/>
+          <a:chOff x="0" y="0"/>
+          <a:chExt cx="0" cy="0"/>
+        </a:xfrm>
+      </p:grpSpPr>
+      <p:sp>
+        <p:nvSpPr>
+          <p:cNvPr id="2" name="Title 1"/>
+          <p:cNvSpPr>
+            <a:spLocks noGrp="1"/>
+          </p:cNvSpPr>
+          <p:nvPr>
+            <p:ph type="title"/>
+          </p:nvPr>
+        </p:nvSpPr>
+        <p:spPr/>
+        <p:txBody>
+          <a:bodyPr/>
+          <a:lstStyle/>
+          <a:p>
+            <a:r>
+              <a:rPr lang="nb-NO" dirty="0" smtClean="0"/>
+              <a:t>Database </a:t>
+            </a:r>
+            <a:r>
+              <a:rPr lang="nb-NO" dirty="0" err="1" smtClean="0"/>
+              <a:t>package</a:t>
+            </a:r>
+            <a:r>
+              <a:rPr lang="nb-NO" dirty="0" smtClean="0"/>
+              <a:t> </a:t>
+            </a:r>
+            <a:r>
+              <a:rPr lang="nb-NO" dirty="0" err="1" smtClean="0"/>
+              <a:t>versioning</a:t>
+            </a:r>
+            <a:endParaRPr lang="nb-NO" dirty="0"/>
+          </a:p>
+        </p:txBody>
+      </p:sp>
+      <p:sp>
+        <p:nvSpPr>
+          <p:cNvPr id="3" name="Content Placeholder 2"/>
+          <p:cNvSpPr>
+            <a:spLocks noGrp="1"/>
+          </p:cNvSpPr>
+          <p:nvPr>
+            <p:ph idx="1"/>
+          </p:nvPr>
+        </p:nvSpPr>
+        <p:spPr/>
+        <p:txBody>
+          <a:bodyPr/>
+          <a:lstStyle/>
+          <a:p>
+            <a:pPr marL="0" indent="0">
+              <a:buNone/>
+            </a:pPr>
+            <a:r>
+              <a:rPr lang="nb-NO" dirty="0" smtClean="0"/>
+              <a:t>To separate </a:t>
+            </a:r>
+            <a:r>
+              <a:rPr lang="nb-NO" dirty="0" err="1" smtClean="0"/>
+              <a:t>we</a:t>
+            </a:r>
+            <a:r>
+              <a:rPr lang="nb-NO" dirty="0" smtClean="0"/>
+              <a:t> </a:t>
+            </a:r>
+            <a:r>
+              <a:rPr lang="nb-NO" dirty="0" err="1" smtClean="0"/>
+              <a:t>can</a:t>
+            </a:r>
+            <a:r>
+              <a:rPr lang="nb-NO" dirty="0" smtClean="0"/>
+              <a:t> </a:t>
+            </a:r>
+            <a:r>
+              <a:rPr lang="nb-NO" dirty="0" err="1" smtClean="0"/>
+              <a:t>use</a:t>
+            </a:r>
+            <a:r>
+              <a:rPr lang="nb-NO" dirty="0" smtClean="0"/>
+              <a:t> </a:t>
+            </a:r>
+            <a:r>
+              <a:rPr lang="nb-NO" dirty="0" err="1" smtClean="0"/>
+              <a:t>programversion</a:t>
+            </a:r>
+            <a:r>
+              <a:rPr lang="nb-NO" dirty="0" smtClean="0"/>
+              <a:t> and </a:t>
+            </a:r>
+            <a:r>
+              <a:rPr lang="nb-NO" dirty="0" err="1" smtClean="0"/>
+              <a:t>nugetversion</a:t>
+            </a:r>
+            <a:endParaRPr lang="nb-NO" dirty="0" smtClean="0"/>
+          </a:p>
+          <a:p>
+            <a:pPr marL="0" indent="0">
+              <a:buNone/>
+            </a:pPr>
+            <a:endParaRPr lang="nb-NO" dirty="0" smtClean="0"/>
+          </a:p>
+          <a:p>
+            <a:pPr marL="0" indent="0">
+              <a:buNone/>
+            </a:pPr>
+            <a:r>
+              <a:rPr lang="nb-NO" dirty="0" smtClean="0"/>
+              <a:t>Id: </a:t>
+            </a:r>
+            <a:r>
+              <a:rPr lang="nb-NO" dirty="0" err="1" smtClean="0"/>
+              <a:t>dips</a:t>
+            </a:r>
+            <a:r>
+              <a:rPr lang="nb-NO" dirty="0" smtClean="0"/>
+              <a:t>-arena-</a:t>
+            </a:r>
+            <a:r>
+              <a:rPr lang="nb-NO" dirty="0" err="1" smtClean="0"/>
+              <a:t>programpackage</a:t>
+            </a:r>
+            <a:r>
+              <a:rPr lang="nb-NO" dirty="0" smtClean="0"/>
+              <a:t>-database-</a:t>
+            </a:r>
+            <a:r>
+              <a:rPr lang="nb-NO" dirty="0" smtClean="0"/>
+              <a:t>$</a:t>
+            </a:r>
+            <a:r>
+              <a:rPr lang="nb-NO" dirty="0" err="1" smtClean="0"/>
+              <a:t>programversion</a:t>
+            </a:r>
+            <a:endParaRPr lang="nb-NO" dirty="0" smtClean="0"/>
+          </a:p>
+          <a:p>
+            <a:pPr marL="0" indent="0">
+              <a:buNone/>
+            </a:pPr>
+            <a:r>
+              <a:rPr lang="nb-NO" dirty="0" smtClean="0"/>
+              <a:t>Version: $</a:t>
+            </a:r>
+            <a:r>
+              <a:rPr lang="nb-NO" dirty="0" err="1" smtClean="0"/>
+              <a:t>nugetversion</a:t>
+            </a:r>
+            <a:endParaRPr lang="nb-NO" dirty="0" smtClean="0"/>
+          </a:p>
+          <a:p>
+            <a:pPr marL="0" indent="0">
+              <a:buNone/>
+            </a:pPr>
+            <a:endParaRPr lang="nb-NO" dirty="0"/>
+          </a:p>
+          <a:p>
+            <a:pPr marL="0" indent="0">
+              <a:buNone/>
+            </a:pPr>
+            <a:endParaRPr lang="nb-NO" dirty="0"/>
+          </a:p>
+        </p:txBody>
+      </p:sp>
+    </p:spTree>
+    <p:extLst>
+      <p:ext uri="{BB962C8B-B14F-4D97-AF65-F5344CB8AC3E}">
+        <p14:creationId xmlns:p14="http://schemas.microsoft.com/office/powerpoint/2010/main" val="1321381453"/>
+      </p:ext>
+    </p:extLst>
+  </p:cSld>
+  <p:clrMapOvr>
+    <a:masterClrMapping/>
+  </p:clrMapOvr>
+</p:sld>
+</file>
+
+<file path=ppt/slides/slide52.xml><?xml version="1.0" encoding="utf-8"?>
+<p:sld xmlns:a="http://schemas.openxmlformats.org/drawingml/2006/main" xmlns:r="http://schemas.openxmlformats.org/officeDocument/2006/relationships" xmlns:p="http://schemas.openxmlformats.org/presentationml/2006/main">
+  <p:cSld>
+    <p:spTree>
+      <p:nvGrpSpPr>
+        <p:cNvPr id="1" name=""/>
+        <p:cNvGrpSpPr/>
+        <p:nvPr/>
+      </p:nvGrpSpPr>
+      <p:grpSpPr>
+        <a:xfrm>
+          <a:off x="0" y="0"/>
+          <a:ext cx="0" cy="0"/>
+          <a:chOff x="0" y="0"/>
+          <a:chExt cx="0" cy="0"/>
+        </a:xfrm>
+      </p:grpSpPr>
+      <p:sp>
+        <p:nvSpPr>
+          <p:cNvPr id="2" name="Title 1"/>
+          <p:cNvSpPr>
+            <a:spLocks noGrp="1"/>
+          </p:cNvSpPr>
+          <p:nvPr>
+            <p:ph type="title"/>
+          </p:nvPr>
+        </p:nvSpPr>
+        <p:spPr/>
+        <p:txBody>
+          <a:bodyPr/>
+          <a:lstStyle/>
+          <a:p>
+            <a:r>
+              <a:rPr lang="nb-NO" dirty="0" smtClean="0"/>
+              <a:t>Database </a:t>
+            </a:r>
+            <a:r>
+              <a:rPr lang="nb-NO" dirty="0" err="1" smtClean="0"/>
+              <a:t>package</a:t>
+            </a:r>
+            <a:r>
+              <a:rPr lang="nb-NO" dirty="0" smtClean="0"/>
+              <a:t> normal </a:t>
+            </a:r>
+            <a:r>
+              <a:rPr lang="nb-NO" dirty="0" err="1" smtClean="0"/>
+              <a:t>installation</a:t>
+            </a:r>
+            <a:endParaRPr lang="nb-NO" dirty="0"/>
+          </a:p>
+        </p:txBody>
+      </p:sp>
+      <p:sp>
+        <p:nvSpPr>
+          <p:cNvPr id="3" name="Content Placeholder 2"/>
+          <p:cNvSpPr>
+            <a:spLocks noGrp="1"/>
+          </p:cNvSpPr>
+          <p:nvPr>
+            <p:ph idx="1"/>
+          </p:nvPr>
+        </p:nvSpPr>
+        <p:spPr/>
+        <p:txBody>
+          <a:bodyPr/>
+          <a:lstStyle/>
+          <a:p>
+            <a:r>
+              <a:rPr lang="nb-NO" dirty="0" smtClean="0"/>
+              <a:t>A database </a:t>
+            </a:r>
+            <a:r>
+              <a:rPr lang="nb-NO" dirty="0" err="1" smtClean="0"/>
+              <a:t>chocolatey</a:t>
+            </a:r>
+            <a:r>
+              <a:rPr lang="nb-NO" dirty="0" smtClean="0"/>
+              <a:t> </a:t>
+            </a:r>
+            <a:r>
+              <a:rPr lang="nb-NO" dirty="0" err="1" smtClean="0"/>
+              <a:t>package</a:t>
+            </a:r>
+            <a:r>
+              <a:rPr lang="nb-NO" dirty="0" smtClean="0"/>
+              <a:t> </a:t>
+            </a:r>
+            <a:r>
+              <a:rPr lang="nb-NO" dirty="0" err="1" smtClean="0"/>
+              <a:t>will</a:t>
+            </a:r>
+            <a:r>
+              <a:rPr lang="nb-NO" dirty="0"/>
+              <a:t> </a:t>
+            </a:r>
+            <a:r>
+              <a:rPr lang="nb-NO" dirty="0" smtClean="0"/>
+              <a:t>register </a:t>
+            </a:r>
+            <a:r>
+              <a:rPr lang="nb-NO" dirty="0" err="1" smtClean="0"/>
+              <a:t>itself</a:t>
+            </a:r>
+            <a:r>
+              <a:rPr lang="nb-NO" dirty="0" smtClean="0"/>
+              <a:t> </a:t>
+            </a:r>
+            <a:r>
+              <a:rPr lang="nb-NO" dirty="0" err="1" smtClean="0"/>
+              <a:t>into</a:t>
+            </a:r>
+            <a:r>
+              <a:rPr lang="nb-NO" dirty="0" smtClean="0"/>
+              <a:t> </a:t>
+            </a:r>
+            <a:r>
+              <a:rPr lang="nb-NO" dirty="0" err="1" smtClean="0"/>
+              <a:t>dwdbversjonlogg</a:t>
+            </a:r>
+            <a:r>
+              <a:rPr lang="nb-NO" dirty="0" smtClean="0"/>
+              <a:t> in </a:t>
+            </a:r>
+            <a:r>
+              <a:rPr lang="nb-NO" dirty="0" err="1" smtClean="0"/>
+              <a:t>the</a:t>
+            </a:r>
+            <a:r>
+              <a:rPr lang="nb-NO" dirty="0" smtClean="0"/>
+              <a:t> database</a:t>
+            </a:r>
+          </a:p>
+          <a:p>
+            <a:r>
+              <a:rPr lang="nb-NO" dirty="0" smtClean="0"/>
+              <a:t>A </a:t>
+            </a:r>
+            <a:r>
+              <a:rPr lang="nb-NO" dirty="0"/>
+              <a:t>database </a:t>
+            </a:r>
+            <a:r>
+              <a:rPr lang="nb-NO" dirty="0" err="1"/>
+              <a:t>chocolatey</a:t>
+            </a:r>
+            <a:r>
+              <a:rPr lang="nb-NO" dirty="0"/>
+              <a:t> </a:t>
+            </a:r>
+            <a:r>
+              <a:rPr lang="nb-NO" dirty="0" err="1"/>
+              <a:t>package</a:t>
+            </a:r>
+            <a:r>
+              <a:rPr lang="nb-NO" dirty="0"/>
+              <a:t> </a:t>
+            </a:r>
+            <a:r>
+              <a:rPr lang="nb-NO" dirty="0" err="1" smtClean="0"/>
+              <a:t>can</a:t>
+            </a:r>
+            <a:r>
+              <a:rPr lang="nb-NO" dirty="0" smtClean="0"/>
+              <a:t> </a:t>
+            </a:r>
+            <a:r>
+              <a:rPr lang="nb-NO" dirty="0" err="1" smtClean="0"/>
+              <a:t>only</a:t>
+            </a:r>
+            <a:r>
+              <a:rPr lang="nb-NO" dirty="0" smtClean="0"/>
+              <a:t> be </a:t>
+            </a:r>
+            <a:r>
+              <a:rPr lang="nb-NO" dirty="0" err="1" smtClean="0"/>
+              <a:t>installed</a:t>
+            </a:r>
+            <a:r>
+              <a:rPr lang="nb-NO" dirty="0" smtClean="0"/>
+              <a:t> </a:t>
+            </a:r>
+            <a:r>
+              <a:rPr lang="nb-NO" dirty="0" err="1" smtClean="0"/>
+              <a:t>into</a:t>
+            </a:r>
+            <a:r>
+              <a:rPr lang="nb-NO" dirty="0" smtClean="0"/>
+              <a:t> </a:t>
+            </a:r>
+            <a:r>
+              <a:rPr lang="nb-NO" dirty="0" err="1" smtClean="0"/>
+              <a:t>the</a:t>
+            </a:r>
+            <a:r>
+              <a:rPr lang="nb-NO" dirty="0" smtClean="0"/>
+              <a:t> database </a:t>
+            </a:r>
+            <a:r>
+              <a:rPr lang="nb-NO" dirty="0" err="1" smtClean="0"/>
+              <a:t>one</a:t>
+            </a:r>
+            <a:r>
+              <a:rPr lang="nb-NO" dirty="0" smtClean="0"/>
+              <a:t> time.</a:t>
+            </a:r>
+          </a:p>
+          <a:p>
+            <a:r>
+              <a:rPr lang="nb-NO" dirty="0" err="1" smtClean="0"/>
+              <a:t>Therefore</a:t>
+            </a:r>
+            <a:r>
+              <a:rPr lang="nb-NO" dirty="0" smtClean="0"/>
+              <a:t>, </a:t>
+            </a:r>
+            <a:r>
+              <a:rPr lang="nb-NO" dirty="0" err="1"/>
+              <a:t>w</a:t>
+            </a:r>
+            <a:r>
+              <a:rPr lang="nb-NO" dirty="0" err="1" smtClean="0"/>
+              <a:t>hen</a:t>
+            </a:r>
+            <a:r>
+              <a:rPr lang="nb-NO" dirty="0" smtClean="0"/>
+              <a:t> a </a:t>
+            </a:r>
+            <a:r>
+              <a:rPr lang="nb-NO" dirty="0" err="1" smtClean="0"/>
+              <a:t>specific</a:t>
+            </a:r>
+            <a:r>
+              <a:rPr lang="nb-NO" dirty="0" smtClean="0"/>
+              <a:t> database </a:t>
+            </a:r>
+            <a:r>
+              <a:rPr lang="nb-NO" dirty="0" err="1" smtClean="0"/>
+              <a:t>package</a:t>
+            </a:r>
+            <a:r>
+              <a:rPr lang="nb-NO" dirty="0" smtClean="0"/>
+              <a:t> id has </a:t>
+            </a:r>
+            <a:r>
+              <a:rPr lang="nb-NO" dirty="0" err="1" smtClean="0"/>
+              <a:t>been</a:t>
+            </a:r>
+            <a:r>
+              <a:rPr lang="nb-NO" dirty="0" smtClean="0"/>
+              <a:t> </a:t>
+            </a:r>
+            <a:r>
+              <a:rPr lang="nb-NO" dirty="0" err="1" smtClean="0"/>
+              <a:t>released</a:t>
+            </a:r>
+            <a:r>
+              <a:rPr lang="nb-NO" dirty="0" smtClean="0"/>
+              <a:t> </a:t>
+            </a:r>
+            <a:r>
+              <a:rPr lang="nb-NO" dirty="0" err="1" smtClean="0"/>
+              <a:t>its</a:t>
+            </a:r>
+            <a:r>
+              <a:rPr lang="nb-NO" dirty="0" smtClean="0"/>
+              <a:t> </a:t>
+            </a:r>
+            <a:r>
+              <a:rPr lang="nb-NO" dirty="0" err="1" smtClean="0"/>
+              <a:t>content</a:t>
+            </a:r>
+            <a:r>
+              <a:rPr lang="nb-NO" dirty="0" smtClean="0"/>
+              <a:t> </a:t>
+            </a:r>
+            <a:r>
+              <a:rPr lang="nb-NO" dirty="0" err="1" smtClean="0"/>
+              <a:t>can</a:t>
+            </a:r>
+            <a:r>
+              <a:rPr lang="nb-NO" dirty="0" smtClean="0"/>
+              <a:t> not be </a:t>
+            </a:r>
+            <a:r>
+              <a:rPr lang="nb-NO" dirty="0" err="1" smtClean="0"/>
+              <a:t>changed</a:t>
+            </a:r>
+            <a:r>
+              <a:rPr lang="nb-NO" dirty="0" smtClean="0"/>
+              <a:t> in a </a:t>
+            </a:r>
+            <a:r>
+              <a:rPr lang="nb-NO" dirty="0" err="1" smtClean="0"/>
+              <a:t>way</a:t>
+            </a:r>
+            <a:r>
+              <a:rPr lang="nb-NO" dirty="0" smtClean="0"/>
+              <a:t> </a:t>
+            </a:r>
+            <a:r>
+              <a:rPr lang="nb-NO" dirty="0" err="1" smtClean="0"/>
+              <a:t>that</a:t>
+            </a:r>
+            <a:r>
+              <a:rPr lang="nb-NO" dirty="0" smtClean="0"/>
+              <a:t> </a:t>
+            </a:r>
+            <a:r>
+              <a:rPr lang="nb-NO" dirty="0" err="1" smtClean="0"/>
+              <a:t>upgrades</a:t>
+            </a:r>
+            <a:r>
+              <a:rPr lang="nb-NO" dirty="0" smtClean="0"/>
+              <a:t> </a:t>
+            </a:r>
+            <a:r>
+              <a:rPr lang="nb-NO" dirty="0" err="1" smtClean="0"/>
+              <a:t>the</a:t>
+            </a:r>
+            <a:r>
+              <a:rPr lang="nb-NO" dirty="0" smtClean="0"/>
+              <a:t> database </a:t>
+            </a:r>
+            <a:r>
+              <a:rPr lang="nb-NO" dirty="0" err="1" smtClean="0"/>
+              <a:t>differently</a:t>
+            </a:r>
+            <a:r>
+              <a:rPr lang="nb-NO" dirty="0" smtClean="0"/>
+              <a:t> (alters </a:t>
+            </a:r>
+            <a:r>
+              <a:rPr lang="nb-NO" dirty="0" err="1" smtClean="0"/>
+              <a:t>state</a:t>
+            </a:r>
+            <a:r>
+              <a:rPr lang="nb-NO" dirty="0" smtClean="0"/>
+              <a:t>).</a:t>
+            </a:r>
+          </a:p>
+          <a:p>
+            <a:r>
+              <a:rPr lang="nb-NO" dirty="0" err="1" smtClean="0"/>
+              <a:t>Changes</a:t>
+            </a:r>
+            <a:r>
+              <a:rPr lang="nb-NO" dirty="0" smtClean="0"/>
+              <a:t> </a:t>
+            </a:r>
+            <a:r>
+              <a:rPr lang="nb-NO" dirty="0" err="1" smtClean="0"/>
+              <a:t>that</a:t>
+            </a:r>
+            <a:r>
+              <a:rPr lang="nb-NO" dirty="0" smtClean="0"/>
+              <a:t> makes </a:t>
+            </a:r>
+            <a:r>
+              <a:rPr lang="nb-NO" dirty="0" err="1" smtClean="0"/>
+              <a:t>the</a:t>
+            </a:r>
+            <a:r>
+              <a:rPr lang="nb-NO" dirty="0" smtClean="0"/>
+              <a:t> </a:t>
+            </a:r>
+            <a:r>
+              <a:rPr lang="nb-NO" dirty="0" err="1" smtClean="0"/>
+              <a:t>package</a:t>
+            </a:r>
+            <a:r>
+              <a:rPr lang="nb-NO" dirty="0" smtClean="0"/>
+              <a:t> (</a:t>
+            </a:r>
+            <a:r>
+              <a:rPr lang="nb-NO" dirty="0" err="1" smtClean="0"/>
+              <a:t>dupfiles</a:t>
+            </a:r>
+            <a:r>
+              <a:rPr lang="nb-NO" dirty="0" smtClean="0"/>
+              <a:t>) more robust to </a:t>
+            </a:r>
+            <a:r>
+              <a:rPr lang="nb-NO" dirty="0" err="1" smtClean="0"/>
+              <a:t>execution</a:t>
+            </a:r>
+            <a:r>
+              <a:rPr lang="nb-NO" dirty="0" smtClean="0"/>
+              <a:t> </a:t>
+            </a:r>
+            <a:r>
+              <a:rPr lang="nb-NO" dirty="0" err="1" smtClean="0"/>
+              <a:t>errors</a:t>
+            </a:r>
+            <a:r>
+              <a:rPr lang="nb-NO" dirty="0" smtClean="0"/>
+              <a:t> </a:t>
+            </a:r>
+            <a:r>
+              <a:rPr lang="nb-NO" dirty="0" err="1" smtClean="0"/>
+              <a:t>are</a:t>
+            </a:r>
+            <a:r>
+              <a:rPr lang="nb-NO" dirty="0" smtClean="0"/>
+              <a:t> </a:t>
+            </a:r>
+            <a:r>
+              <a:rPr lang="nb-NO" dirty="0" err="1" smtClean="0"/>
+              <a:t>allowed</a:t>
+            </a:r>
+            <a:r>
+              <a:rPr lang="nb-NO" dirty="0" smtClean="0"/>
+              <a:t> </a:t>
+            </a:r>
+            <a:r>
+              <a:rPr lang="nb-NO" dirty="0" err="1" smtClean="0"/>
+              <a:t>because</a:t>
+            </a:r>
+            <a:r>
+              <a:rPr lang="nb-NO" dirty="0" smtClean="0"/>
+              <a:t> </a:t>
+            </a:r>
+            <a:r>
+              <a:rPr lang="nb-NO" dirty="0" err="1" smtClean="0"/>
+              <a:t>they</a:t>
+            </a:r>
+            <a:r>
+              <a:rPr lang="nb-NO" dirty="0" smtClean="0"/>
+              <a:t> do not </a:t>
+            </a:r>
+            <a:r>
+              <a:rPr lang="nb-NO" dirty="0" err="1" smtClean="0"/>
+              <a:t>cause</a:t>
+            </a:r>
+            <a:r>
+              <a:rPr lang="nb-NO" dirty="0" smtClean="0"/>
+              <a:t> </a:t>
+            </a:r>
+            <a:r>
+              <a:rPr lang="nb-NO" dirty="0" err="1" smtClean="0"/>
+              <a:t>any</a:t>
+            </a:r>
+            <a:r>
+              <a:rPr lang="nb-NO" dirty="0" smtClean="0"/>
+              <a:t> different </a:t>
+            </a:r>
+            <a:r>
+              <a:rPr lang="nb-NO" dirty="0" err="1" smtClean="0"/>
+              <a:t>content</a:t>
+            </a:r>
+            <a:r>
+              <a:rPr lang="nb-NO" dirty="0" smtClean="0"/>
+              <a:t> in </a:t>
+            </a:r>
+            <a:r>
+              <a:rPr lang="nb-NO" dirty="0" err="1" smtClean="0"/>
+              <a:t>the</a:t>
+            </a:r>
+            <a:r>
+              <a:rPr lang="nb-NO" dirty="0" smtClean="0"/>
+              <a:t> database.</a:t>
+            </a:r>
+            <a:endParaRPr lang="nb-NO" dirty="0"/>
+          </a:p>
+        </p:txBody>
+      </p:sp>
+    </p:spTree>
+    <p:extLst>
+      <p:ext uri="{BB962C8B-B14F-4D97-AF65-F5344CB8AC3E}">
+        <p14:creationId xmlns:p14="http://schemas.microsoft.com/office/powerpoint/2010/main" val="772227438"/>
+      </p:ext>
+    </p:extLst>
+  </p:cSld>
+  <p:clrMapOvr>
+    <a:masterClrMapping/>
+  </p:clrMapOvr>
+</p:sld>
+</file>
+
+<file path=ppt/slides/slide53.xml><?xml version="1.0" encoding="utf-8"?>
+<p:sld xmlns:a="http://schemas.openxmlformats.org/drawingml/2006/main" xmlns:r="http://schemas.openxmlformats.org/officeDocument/2006/relationships" xmlns:p="http://schemas.openxmlformats.org/presentationml/2006/main">
+  <p:cSld>
+    <p:spTree>
+      <p:nvGrpSpPr>
+        <p:cNvPr id="1" name=""/>
+        <p:cNvGrpSpPr/>
+        <p:nvPr/>
+      </p:nvGrpSpPr>
+      <p:grpSpPr>
+        <a:xfrm>
+          <a:off x="0" y="0"/>
+          <a:ext cx="0" cy="0"/>
+          <a:chOff x="0" y="0"/>
+          <a:chExt cx="0" cy="0"/>
+        </a:xfrm>
+      </p:grpSpPr>
+      <p:sp>
+        <p:nvSpPr>
+          <p:cNvPr id="2" name="Title 1"/>
+          <p:cNvSpPr>
+            <a:spLocks noGrp="1"/>
+          </p:cNvSpPr>
+          <p:nvPr>
+            <p:ph type="title"/>
+          </p:nvPr>
+        </p:nvSpPr>
+        <p:spPr/>
+        <p:txBody>
+          <a:bodyPr/>
+          <a:lstStyle/>
+          <a:p>
+            <a:r>
+              <a:rPr lang="nb-NO" dirty="0" smtClean="0"/>
+              <a:t>Database </a:t>
+            </a:r>
+            <a:r>
+              <a:rPr lang="nb-NO" dirty="0" err="1" smtClean="0"/>
+              <a:t>package</a:t>
+            </a:r>
+            <a:r>
+              <a:rPr lang="nb-NO" dirty="0" smtClean="0"/>
+              <a:t> </a:t>
+            </a:r>
+            <a:r>
+              <a:rPr lang="nb-NO" dirty="0" err="1" smtClean="0"/>
+              <a:t>versioning</a:t>
+            </a:r>
+            <a:endParaRPr lang="nb-NO" dirty="0"/>
+          </a:p>
+        </p:txBody>
+      </p:sp>
+      <p:sp>
+        <p:nvSpPr>
+          <p:cNvPr id="3" name="Content Placeholder 2"/>
+          <p:cNvSpPr>
+            <a:spLocks noGrp="1"/>
+          </p:cNvSpPr>
+          <p:nvPr>
+            <p:ph idx="1"/>
+          </p:nvPr>
+        </p:nvSpPr>
+        <p:spPr/>
+        <p:txBody>
+          <a:bodyPr/>
+          <a:lstStyle/>
+          <a:p>
+            <a:pPr marL="0" indent="0">
+              <a:buNone/>
+            </a:pPr>
+            <a:endParaRPr lang="nb-NO" i="1" dirty="0"/>
+          </a:p>
+        </p:txBody>
+      </p:sp>
+      <p:sp>
+        <p:nvSpPr>
+          <p:cNvPr id="5" name="Flowchart: Process 4"/>
+          <p:cNvSpPr/>
+          <p:nvPr/>
+        </p:nvSpPr>
+        <p:spPr>
+          <a:xfrm>
+            <a:off x="1209502" y="3152086"/>
+            <a:ext cx="2427317" cy="540327"/>
+          </a:xfrm>
+          <a:prstGeom prst="flowChartProcess">
+            <a:avLst/>
+          </a:prstGeom>
+        </p:spPr>
+        <p:style>
+          <a:lnRef idx="2">
+            <a:schemeClr val="accent1">
+              <a:shade val="50000"/>
+            </a:schemeClr>
+          </a:lnRef>
+          <a:fillRef idx="1">
+            <a:schemeClr val="accent1"/>
+          </a:fillRef>
+          <a:effectRef idx="0">
+            <a:schemeClr val="accent1"/>
+          </a:effectRef>
+          <a:fontRef idx="minor">
+            <a:schemeClr val="lt1"/>
+          </a:fontRef>
+        </p:style>
+        <p:txBody>
+          <a:bodyPr rtlCol="0" anchor="ctr"/>
+          <a:lstStyle/>
+          <a:p>
+            <a:pPr algn="ctr"/>
+            <a:r>
+              <a:rPr lang="nb-NO" sz="1100" dirty="0" smtClean="0"/>
+              <a:t>dips-arena-framework-database-19.1.0</a:t>
+            </a:r>
+          </a:p>
+          <a:p>
+            <a:pPr algn="ctr"/>
+            <a:r>
+              <a:rPr lang="nb-NO" sz="1100" dirty="0" smtClean="0"/>
+              <a:t>1.0.0</a:t>
+            </a:r>
+            <a:endParaRPr lang="nb-NO" sz="1100" dirty="0"/>
+          </a:p>
+        </p:txBody>
+      </p:sp>
+      <p:sp>
+        <p:nvSpPr>
+          <p:cNvPr id="7" name="Flowchart: Process 6"/>
+          <p:cNvSpPr/>
+          <p:nvPr/>
+        </p:nvSpPr>
+        <p:spPr>
+          <a:xfrm>
+            <a:off x="3660370" y="3856950"/>
+            <a:ext cx="2435630" cy="540327"/>
+          </a:xfrm>
+          <a:prstGeom prst="flowChartProcess">
+            <a:avLst/>
+          </a:prstGeom>
+        </p:spPr>
+        <p:style>
+          <a:lnRef idx="2">
+            <a:schemeClr val="accent1">
+              <a:shade val="50000"/>
+            </a:schemeClr>
+          </a:lnRef>
+          <a:fillRef idx="1">
+            <a:schemeClr val="accent1"/>
+          </a:fillRef>
+          <a:effectRef idx="0">
+            <a:schemeClr val="accent1"/>
+          </a:effectRef>
+          <a:fontRef idx="minor">
+            <a:schemeClr val="lt1"/>
+          </a:fontRef>
+        </p:style>
+        <p:txBody>
+          <a:bodyPr rtlCol="0" anchor="ctr"/>
+          <a:lstStyle/>
+          <a:p>
+            <a:pPr algn="ctr"/>
+            <a:r>
+              <a:rPr lang="nb-NO" sz="1100" dirty="0" smtClean="0"/>
+              <a:t>dips-arena-framework-database-19.1.0</a:t>
+            </a:r>
+          </a:p>
+          <a:p>
+            <a:pPr algn="ctr"/>
+            <a:r>
+              <a:rPr lang="nb-NO" sz="1100" dirty="0" smtClean="0"/>
+              <a:t>1.0.1</a:t>
+            </a:r>
+            <a:endParaRPr lang="nb-NO" sz="1100" dirty="0"/>
+          </a:p>
+        </p:txBody>
+      </p:sp>
+      <p:sp>
+        <p:nvSpPr>
+          <p:cNvPr id="8" name="Flowchart: Process 7"/>
+          <p:cNvSpPr/>
+          <p:nvPr/>
+        </p:nvSpPr>
+        <p:spPr>
+          <a:xfrm>
+            <a:off x="6123709" y="4576220"/>
+            <a:ext cx="2435630" cy="540327"/>
+          </a:xfrm>
+          <a:prstGeom prst="flowChartProcess">
+            <a:avLst/>
+          </a:prstGeom>
+        </p:spPr>
+        <p:style>
+          <a:lnRef idx="2">
+            <a:schemeClr val="accent1">
+              <a:shade val="50000"/>
+            </a:schemeClr>
+          </a:lnRef>
+          <a:fillRef idx="1">
+            <a:schemeClr val="accent1"/>
+          </a:fillRef>
+          <a:effectRef idx="0">
+            <a:schemeClr val="accent1"/>
+          </a:effectRef>
+          <a:fontRef idx="minor">
+            <a:schemeClr val="lt1"/>
+          </a:fontRef>
+        </p:style>
+        <p:txBody>
+          <a:bodyPr rtlCol="0" anchor="ctr"/>
+          <a:lstStyle/>
+          <a:p>
+            <a:pPr algn="ctr"/>
+            <a:r>
+              <a:rPr lang="nb-NO" sz="1100" dirty="0" smtClean="0"/>
+              <a:t>dips-arena-framework-database-19.1.0</a:t>
+            </a:r>
+          </a:p>
+          <a:p>
+            <a:pPr algn="ctr"/>
+            <a:r>
+              <a:rPr lang="nb-NO" sz="1100" dirty="0" smtClean="0"/>
+              <a:t>1.0.2</a:t>
+            </a:r>
+            <a:endParaRPr lang="nb-NO" sz="1100" dirty="0"/>
+          </a:p>
+        </p:txBody>
+      </p:sp>
+      <p:sp>
+        <p:nvSpPr>
+          <p:cNvPr id="9" name="Flowchart: Process 8"/>
+          <p:cNvSpPr/>
+          <p:nvPr/>
+        </p:nvSpPr>
+        <p:spPr>
+          <a:xfrm>
+            <a:off x="8588431" y="5247655"/>
+            <a:ext cx="2793077" cy="540327"/>
+          </a:xfrm>
+          <a:prstGeom prst="flowChartProcess">
+            <a:avLst/>
+          </a:prstGeom>
+        </p:spPr>
+        <p:style>
+          <a:lnRef idx="2">
+            <a:schemeClr val="accent1">
+              <a:shade val="50000"/>
+            </a:schemeClr>
+          </a:lnRef>
+          <a:fillRef idx="1">
+            <a:schemeClr val="accent1"/>
+          </a:fillRef>
+          <a:effectRef idx="0">
+            <a:schemeClr val="accent1"/>
+          </a:effectRef>
+          <a:fontRef idx="minor">
+            <a:schemeClr val="lt1"/>
+          </a:fontRef>
+        </p:style>
+        <p:txBody>
+          <a:bodyPr rtlCol="0" anchor="ctr"/>
+          <a:lstStyle/>
+          <a:p>
+            <a:pPr algn="ctr"/>
+            <a:r>
+              <a:rPr lang="nb-NO" sz="1100" dirty="0" smtClean="0"/>
+              <a:t>dips-arena-framework-database-19.1.0</a:t>
+            </a:r>
+          </a:p>
+          <a:p>
+            <a:pPr algn="ctr"/>
+            <a:r>
+              <a:rPr lang="nb-NO" sz="1100" dirty="0" smtClean="0"/>
+              <a:t>1.0.3</a:t>
+            </a:r>
+            <a:endParaRPr lang="nb-NO" sz="1100" dirty="0"/>
+          </a:p>
+        </p:txBody>
+      </p:sp>
+      <p:cxnSp>
+        <p:nvCxnSpPr>
+          <p:cNvPr id="12" name="Straight Connector 11"/>
+          <p:cNvCxnSpPr/>
+          <p:nvPr/>
+        </p:nvCxnSpPr>
+        <p:spPr>
+          <a:xfrm>
+            <a:off x="1205345" y="2590850"/>
+            <a:ext cx="0" cy="3474720"/>
+          </a:xfrm>
+          <a:prstGeom prst="line">
+            <a:avLst/>
+          </a:prstGeom>
+          <a:ln w="28575">
+            <a:prstDash val="dash"/>
+          </a:ln>
+        </p:spPr>
+        <p:style>
+          <a:lnRef idx="1">
+            <a:schemeClr val="accent1"/>
+          </a:lnRef>
+          <a:fillRef idx="0">
+            <a:schemeClr val="accent1"/>
+          </a:fillRef>
+          <a:effectRef idx="0">
+            <a:schemeClr val="accent1"/>
+          </a:effectRef>
+          <a:fontRef idx="minor">
+            <a:schemeClr val="tx1"/>
+          </a:fontRef>
+        </p:style>
+      </p:cxnSp>
+      <p:cxnSp>
+        <p:nvCxnSpPr>
+          <p:cNvPr id="13" name="Straight Connector 12"/>
+          <p:cNvCxnSpPr/>
+          <p:nvPr/>
+        </p:nvCxnSpPr>
+        <p:spPr>
+          <a:xfrm>
+            <a:off x="6096000" y="2773514"/>
+            <a:ext cx="0" cy="3186711"/>
+          </a:xfrm>
+          <a:prstGeom prst="line">
+            <a:avLst/>
+          </a:prstGeom>
+          <a:ln w="28575">
+            <a:prstDash val="dash"/>
+          </a:ln>
+        </p:spPr>
+        <p:style>
+          <a:lnRef idx="1">
+            <a:schemeClr val="accent1"/>
+          </a:lnRef>
+          <a:fillRef idx="0">
+            <a:schemeClr val="accent1"/>
+          </a:fillRef>
+          <a:effectRef idx="0">
+            <a:schemeClr val="accent1"/>
+          </a:effectRef>
+          <a:fontRef idx="minor">
+            <a:schemeClr val="tx1"/>
+          </a:fontRef>
+        </p:style>
+      </p:cxnSp>
+      <p:sp>
+        <p:nvSpPr>
+          <p:cNvPr id="16" name="TextBox 15"/>
+          <p:cNvSpPr txBox="1"/>
+          <p:nvPr/>
+        </p:nvSpPr>
+        <p:spPr>
+          <a:xfrm>
+            <a:off x="910588" y="1825625"/>
+            <a:ext cx="4218365" cy="646331"/>
+          </a:xfrm>
+          <a:prstGeom prst="rect">
+            <a:avLst/>
+          </a:prstGeom>
+          <a:noFill/>
+        </p:spPr>
+        <p:txBody>
+          <a:bodyPr wrap="square" rtlCol="0">
+            <a:spAutoFit/>
+          </a:bodyPr>
+          <a:lstStyle/>
+          <a:p>
+            <a:r>
+              <a:rPr lang="nb-NO" b="1" u="sng" dirty="0" smtClean="0"/>
+              <a:t>Development</a:t>
+            </a:r>
+            <a:r>
+              <a:rPr lang="nb-NO" dirty="0" smtClean="0"/>
+              <a:t/>
+            </a:r>
+            <a:br>
+              <a:rPr lang="nb-NO" dirty="0" smtClean="0"/>
+            </a:br>
+            <a:r>
+              <a:rPr lang="nb-NO" dirty="0" smtClean="0"/>
+              <a:t>The </a:t>
+            </a:r>
+            <a:r>
+              <a:rPr lang="nb-NO" dirty="0" err="1" smtClean="0"/>
+              <a:t>package</a:t>
+            </a:r>
+            <a:r>
+              <a:rPr lang="nb-NO" dirty="0" smtClean="0"/>
+              <a:t> </a:t>
+            </a:r>
+            <a:r>
+              <a:rPr lang="nb-NO" dirty="0" err="1" smtClean="0"/>
+              <a:t>content</a:t>
+            </a:r>
+            <a:r>
+              <a:rPr lang="nb-NO" dirty="0" smtClean="0"/>
+              <a:t> is </a:t>
+            </a:r>
+            <a:r>
+              <a:rPr lang="nb-NO" dirty="0" err="1" smtClean="0"/>
+              <a:t>changed</a:t>
+            </a:r>
+            <a:r>
+              <a:rPr lang="nb-NO" dirty="0" smtClean="0"/>
+              <a:t> </a:t>
+            </a:r>
+            <a:r>
+              <a:rPr lang="nb-NO" dirty="0" err="1" smtClean="0"/>
+              <a:t>frequently</a:t>
+            </a:r>
+            <a:endParaRPr lang="nb-NO" dirty="0"/>
+          </a:p>
+        </p:txBody>
+      </p:sp>
+      <p:sp>
+        <p:nvSpPr>
+          <p:cNvPr id="17" name="TextBox 16"/>
+          <p:cNvSpPr txBox="1"/>
+          <p:nvPr/>
+        </p:nvSpPr>
+        <p:spPr>
+          <a:xfrm>
+            <a:off x="6068292" y="1796358"/>
+            <a:ext cx="2094808" cy="2031325"/>
+          </a:xfrm>
+          <a:prstGeom prst="rect">
+            <a:avLst/>
+          </a:prstGeom>
+          <a:noFill/>
+        </p:spPr>
+        <p:txBody>
+          <a:bodyPr wrap="square" rtlCol="0">
+            <a:spAutoFit/>
+          </a:bodyPr>
+          <a:lstStyle/>
+          <a:p>
+            <a:r>
+              <a:rPr lang="nb-NO" b="1" i="1" dirty="0" err="1" smtClean="0"/>
+              <a:t>Release</a:t>
+            </a:r>
+            <a:endParaRPr lang="nb-NO" b="1" i="1" dirty="0"/>
+          </a:p>
+          <a:p>
+            <a:r>
+              <a:rPr lang="nb-NO" dirty="0" smtClean="0"/>
+              <a:t>No more database </a:t>
+            </a:r>
+            <a:r>
+              <a:rPr lang="nb-NO" dirty="0" err="1" smtClean="0"/>
+              <a:t>changes</a:t>
+            </a:r>
+            <a:r>
+              <a:rPr lang="nb-NO" dirty="0" smtClean="0"/>
+              <a:t>. The </a:t>
+            </a:r>
+            <a:r>
+              <a:rPr lang="nb-NO" dirty="0" err="1" smtClean="0"/>
+              <a:t>package</a:t>
+            </a:r>
+            <a:r>
+              <a:rPr lang="nb-NO" dirty="0" smtClean="0"/>
+              <a:t> </a:t>
+            </a:r>
+            <a:r>
+              <a:rPr lang="nb-NO" dirty="0" err="1" smtClean="0"/>
+              <a:t>represents</a:t>
+            </a:r>
+            <a:r>
+              <a:rPr lang="nb-NO" dirty="0" smtClean="0"/>
+              <a:t> a </a:t>
+            </a:r>
+            <a:r>
+              <a:rPr lang="nb-NO" dirty="0" err="1" smtClean="0"/>
+              <a:t>version</a:t>
+            </a:r>
+            <a:r>
+              <a:rPr lang="nb-NO" dirty="0" smtClean="0"/>
+              <a:t> </a:t>
+            </a:r>
+            <a:r>
+              <a:rPr lang="nb-NO" dirty="0" err="1" smtClean="0"/>
+              <a:t>with</a:t>
+            </a:r>
+            <a:r>
+              <a:rPr lang="nb-NO" dirty="0" smtClean="0"/>
+              <a:t> a </a:t>
+            </a:r>
+            <a:r>
+              <a:rPr lang="nb-NO" dirty="0" err="1" smtClean="0"/>
+              <a:t>fixed</a:t>
+            </a:r>
+            <a:r>
+              <a:rPr lang="nb-NO" dirty="0" smtClean="0"/>
+              <a:t> </a:t>
+            </a:r>
+            <a:r>
+              <a:rPr lang="nb-NO" dirty="0" err="1" smtClean="0"/>
+              <a:t>content</a:t>
+            </a:r>
+            <a:endParaRPr lang="nb-NO" dirty="0" smtClean="0"/>
+          </a:p>
+          <a:p>
+            <a:endParaRPr lang="nb-NO" dirty="0"/>
+          </a:p>
+        </p:txBody>
+      </p:sp>
+      <p:sp>
+        <p:nvSpPr>
+          <p:cNvPr id="19" name="TextBox 18"/>
+          <p:cNvSpPr txBox="1"/>
+          <p:nvPr/>
+        </p:nvSpPr>
+        <p:spPr>
+          <a:xfrm>
+            <a:off x="8761269" y="4256857"/>
+            <a:ext cx="2094808" cy="923330"/>
+          </a:xfrm>
+          <a:prstGeom prst="rect">
+            <a:avLst/>
+          </a:prstGeom>
+          <a:noFill/>
+        </p:spPr>
+        <p:txBody>
+          <a:bodyPr wrap="square" rtlCol="0">
+            <a:spAutoFit/>
+          </a:bodyPr>
+          <a:lstStyle/>
+          <a:p>
+            <a:r>
+              <a:rPr lang="nb-NO" dirty="0" err="1" smtClean="0"/>
+              <a:t>Package</a:t>
+            </a:r>
+            <a:r>
+              <a:rPr lang="nb-NO" dirty="0" smtClean="0"/>
+              <a:t> </a:t>
+            </a:r>
+            <a:r>
+              <a:rPr lang="nb-NO" dirty="0" err="1" smtClean="0"/>
+              <a:t>changed</a:t>
+            </a:r>
+            <a:r>
+              <a:rPr lang="nb-NO" dirty="0" smtClean="0"/>
+              <a:t> to make it more robust to </a:t>
+            </a:r>
+            <a:r>
+              <a:rPr lang="nb-NO" dirty="0" err="1" smtClean="0"/>
+              <a:t>execution</a:t>
+            </a:r>
+            <a:r>
+              <a:rPr lang="nb-NO" dirty="0" smtClean="0"/>
+              <a:t> </a:t>
+            </a:r>
+            <a:r>
+              <a:rPr lang="nb-NO" dirty="0" err="1" smtClean="0"/>
+              <a:t>errors</a:t>
+            </a:r>
+            <a:endParaRPr lang="nb-NO" dirty="0"/>
+          </a:p>
+        </p:txBody>
+      </p:sp>
+      <p:sp>
+        <p:nvSpPr>
+          <p:cNvPr id="21" name="TextBox 20"/>
+          <p:cNvSpPr txBox="1"/>
+          <p:nvPr/>
+        </p:nvSpPr>
+        <p:spPr>
+          <a:xfrm>
+            <a:off x="3660370" y="3420150"/>
+            <a:ext cx="2094808" cy="369332"/>
+          </a:xfrm>
+          <a:prstGeom prst="rect">
+            <a:avLst/>
+          </a:prstGeom>
+          <a:noFill/>
+        </p:spPr>
+        <p:txBody>
+          <a:bodyPr wrap="square" rtlCol="0">
+            <a:spAutoFit/>
+          </a:bodyPr>
+          <a:lstStyle/>
+          <a:p>
+            <a:r>
+              <a:rPr lang="nb-NO" dirty="0" smtClean="0"/>
+              <a:t>Database </a:t>
+            </a:r>
+            <a:r>
+              <a:rPr lang="nb-NO" dirty="0" err="1" smtClean="0"/>
+              <a:t>changes</a:t>
+            </a:r>
+            <a:endParaRPr lang="nb-NO" dirty="0"/>
+          </a:p>
+        </p:txBody>
+      </p:sp>
+    </p:spTree>
+    <p:extLst>
+      <p:ext uri="{BB962C8B-B14F-4D97-AF65-F5344CB8AC3E}">
+        <p14:creationId xmlns:p14="http://schemas.microsoft.com/office/powerpoint/2010/main" val="553706900"/>
+      </p:ext>
+    </p:extLst>
+  </p:cSld>
+  <p:clrMapOvr>
+    <a:masterClrMapping/>
+  </p:clrMapOvr>
+</p:sld>
+</file>
+
+<file path=ppt/slides/slide54.xml><?xml version="1.0" encoding="utf-8"?>
+<p:sld xmlns:a="http://schemas.openxmlformats.org/drawingml/2006/main" xmlns:r="http://schemas.openxmlformats.org/officeDocument/2006/relationships" xmlns:p="http://schemas.openxmlformats.org/presentationml/2006/main">
+  <p:cSld>
+    <p:spTree>
+      <p:nvGrpSpPr>
+        <p:cNvPr id="1" name=""/>
+        <p:cNvGrpSpPr/>
+        <p:nvPr/>
+      </p:nvGrpSpPr>
+      <p:grpSpPr>
+        <a:xfrm>
+          <a:off x="0" y="0"/>
+          <a:ext cx="0" cy="0"/>
+          <a:chOff x="0" y="0"/>
+          <a:chExt cx="0" cy="0"/>
+        </a:xfrm>
+      </p:grpSpPr>
+      <p:sp>
+        <p:nvSpPr>
+          <p:cNvPr id="2" name="Title 1"/>
+          <p:cNvSpPr>
+            <a:spLocks noGrp="1"/>
+          </p:cNvSpPr>
+          <p:nvPr>
+            <p:ph type="title"/>
+          </p:nvPr>
+        </p:nvSpPr>
+        <p:spPr/>
+        <p:txBody>
+          <a:bodyPr/>
+          <a:lstStyle/>
+          <a:p>
+            <a:r>
+              <a:rPr lang="nb-NO" dirty="0" smtClean="0"/>
+              <a:t>Database </a:t>
+            </a:r>
+            <a:r>
+              <a:rPr lang="nb-NO" dirty="0" err="1" smtClean="0"/>
+              <a:t>deliverypackages</a:t>
+            </a:r>
+            <a:endParaRPr lang="nb-NO" dirty="0"/>
+          </a:p>
+        </p:txBody>
+      </p:sp>
+      <p:sp>
+        <p:nvSpPr>
+          <p:cNvPr id="3" name="Content Placeholder 2"/>
+          <p:cNvSpPr>
+            <a:spLocks noGrp="1"/>
+          </p:cNvSpPr>
+          <p:nvPr>
+            <p:ph idx="1"/>
+          </p:nvPr>
+        </p:nvSpPr>
+        <p:spPr/>
+        <p:txBody>
+          <a:bodyPr/>
+          <a:lstStyle/>
+          <a:p>
+            <a:r>
+              <a:rPr lang="nb-NO" dirty="0" smtClean="0"/>
+              <a:t>Delivery </a:t>
+            </a:r>
+            <a:r>
+              <a:rPr lang="nb-NO" dirty="0" err="1" smtClean="0"/>
+              <a:t>packages</a:t>
+            </a:r>
+            <a:r>
+              <a:rPr lang="nb-NO" dirty="0" smtClean="0"/>
+              <a:t> for database </a:t>
+            </a:r>
+            <a:r>
+              <a:rPr lang="nb-NO" dirty="0" err="1" smtClean="0"/>
+              <a:t>will</a:t>
+            </a:r>
+            <a:r>
+              <a:rPr lang="nb-NO" dirty="0" smtClean="0"/>
+              <a:t> </a:t>
+            </a:r>
+            <a:r>
+              <a:rPr lang="nb-NO" dirty="0" err="1" smtClean="0"/>
+              <a:t>grow</a:t>
+            </a:r>
+            <a:r>
+              <a:rPr lang="nb-NO" dirty="0" smtClean="0"/>
+              <a:t> in </a:t>
+            </a:r>
+            <a:r>
+              <a:rPr lang="nb-NO" dirty="0" err="1" smtClean="0"/>
+              <a:t>size</a:t>
+            </a:r>
+            <a:r>
+              <a:rPr lang="nb-NO" dirty="0" smtClean="0"/>
+              <a:t> for </a:t>
+            </a:r>
+            <a:r>
+              <a:rPr lang="nb-NO" dirty="0" err="1" smtClean="0"/>
+              <a:t>each</a:t>
+            </a:r>
+            <a:r>
+              <a:rPr lang="nb-NO" dirty="0" smtClean="0"/>
+              <a:t> Arena </a:t>
+            </a:r>
+            <a:r>
+              <a:rPr lang="nb-NO" dirty="0" err="1" smtClean="0"/>
+              <a:t>version</a:t>
+            </a:r>
+            <a:r>
+              <a:rPr lang="nb-NO" dirty="0" smtClean="0"/>
+              <a:t>, </a:t>
+            </a:r>
+            <a:r>
+              <a:rPr lang="nb-NO" dirty="0" err="1" smtClean="0"/>
+              <a:t>because</a:t>
+            </a:r>
+            <a:r>
+              <a:rPr lang="nb-NO" dirty="0" smtClean="0"/>
+              <a:t> </a:t>
+            </a:r>
+            <a:r>
+              <a:rPr lang="nb-NO" dirty="0" err="1" smtClean="0"/>
+              <a:t>of</a:t>
+            </a:r>
+            <a:r>
+              <a:rPr lang="nb-NO" dirty="0" smtClean="0"/>
+              <a:t> </a:t>
+            </a:r>
+            <a:r>
+              <a:rPr lang="nb-NO" dirty="0" err="1" smtClean="0"/>
+              <a:t>dependencies</a:t>
+            </a:r>
+            <a:r>
+              <a:rPr lang="nb-NO" dirty="0" smtClean="0"/>
+              <a:t> to </a:t>
+            </a:r>
+            <a:r>
+              <a:rPr lang="nb-NO" dirty="0" err="1" smtClean="0"/>
+              <a:t>previous</a:t>
+            </a:r>
+            <a:r>
+              <a:rPr lang="nb-NO" dirty="0" smtClean="0"/>
+              <a:t> </a:t>
+            </a:r>
+            <a:r>
+              <a:rPr lang="nb-NO" dirty="0" err="1" smtClean="0"/>
+              <a:t>packages</a:t>
+            </a:r>
+            <a:endParaRPr lang="nb-NO" dirty="0" smtClean="0"/>
+          </a:p>
+          <a:p>
+            <a:r>
+              <a:rPr lang="nb-NO" dirty="0" smtClean="0"/>
+              <a:t>A </a:t>
+            </a:r>
+            <a:r>
+              <a:rPr lang="nb-NO" dirty="0" err="1" smtClean="0"/>
+              <a:t>delivery</a:t>
+            </a:r>
+            <a:r>
+              <a:rPr lang="nb-NO" dirty="0" smtClean="0"/>
+              <a:t> </a:t>
+            </a:r>
+            <a:r>
+              <a:rPr lang="nb-NO" dirty="0" err="1" smtClean="0"/>
+              <a:t>package</a:t>
+            </a:r>
+            <a:r>
+              <a:rPr lang="nb-NO" dirty="0" smtClean="0"/>
+              <a:t> for 19.1.0 </a:t>
+            </a:r>
+            <a:r>
+              <a:rPr lang="nb-NO" dirty="0" err="1" smtClean="0"/>
+              <a:t>will</a:t>
+            </a:r>
+            <a:r>
+              <a:rPr lang="nb-NO" dirty="0" smtClean="0"/>
+              <a:t> </a:t>
+            </a:r>
+            <a:r>
+              <a:rPr lang="nb-NO" dirty="0" err="1" smtClean="0"/>
+              <a:t>normally</a:t>
+            </a:r>
+            <a:r>
+              <a:rPr lang="nb-NO" dirty="0" smtClean="0"/>
+              <a:t> </a:t>
+            </a:r>
+            <a:r>
+              <a:rPr lang="nb-NO" dirty="0" err="1" smtClean="0"/>
+              <a:t>contain</a:t>
+            </a:r>
+            <a:r>
+              <a:rPr lang="nb-NO" dirty="0" smtClean="0"/>
+              <a:t> all </a:t>
+            </a:r>
+            <a:r>
+              <a:rPr lang="nb-NO" dirty="0" err="1" smtClean="0"/>
+              <a:t>packages</a:t>
+            </a:r>
+            <a:r>
+              <a:rPr lang="nb-NO" dirty="0" smtClean="0"/>
+              <a:t> from 18.1 </a:t>
+            </a:r>
+            <a:r>
+              <a:rPr lang="nb-NO" dirty="0" err="1" smtClean="0"/>
+              <a:t>plus</a:t>
+            </a:r>
+            <a:r>
+              <a:rPr lang="nb-NO" dirty="0" smtClean="0"/>
+              <a:t> </a:t>
+            </a:r>
+            <a:r>
+              <a:rPr lang="nb-NO" dirty="0" err="1" smtClean="0"/>
+              <a:t>the</a:t>
+            </a:r>
+            <a:r>
+              <a:rPr lang="nb-NO" dirty="0" smtClean="0"/>
+              <a:t> </a:t>
+            </a:r>
+            <a:r>
+              <a:rPr lang="nb-NO" dirty="0" err="1" smtClean="0"/>
+              <a:t>new</a:t>
+            </a:r>
+            <a:r>
+              <a:rPr lang="nb-NO" dirty="0" smtClean="0"/>
+              <a:t> </a:t>
+            </a:r>
+            <a:r>
+              <a:rPr lang="nb-NO" dirty="0" err="1" smtClean="0"/>
+              <a:t>packages</a:t>
+            </a:r>
+            <a:r>
+              <a:rPr lang="nb-NO" dirty="0" smtClean="0"/>
+              <a:t> for 19.1</a:t>
+            </a:r>
+          </a:p>
+        </p:txBody>
+      </p:sp>
+    </p:spTree>
+    <p:extLst>
+      <p:ext uri="{BB962C8B-B14F-4D97-AF65-F5344CB8AC3E}">
+        <p14:creationId xmlns:p14="http://schemas.microsoft.com/office/powerpoint/2010/main" val="182237764"/>
+      </p:ext>
+    </p:extLst>
+  </p:cSld>
+  <p:clrMapOvr>
+    <a:masterClrMapping/>
+  </p:clrMapOvr>
+</p:sld>
+</file>
+
+<file path=ppt/slides/slide55.xml><?xml version="1.0" encoding="utf-8"?>
+<p:sld xmlns:a="http://schemas.openxmlformats.org/drawingml/2006/main" xmlns:r="http://schemas.openxmlformats.org/officeDocument/2006/relationships" xmlns:p="http://schemas.openxmlformats.org/presentationml/2006/main">
+  <p:cSld>
+    <p:spTree>
+      <p:nvGrpSpPr>
+        <p:cNvPr id="1" name=""/>
+        <p:cNvGrpSpPr/>
+        <p:nvPr/>
+      </p:nvGrpSpPr>
+      <p:grpSpPr>
+        <a:xfrm>
+          <a:off x="0" y="0"/>
+          <a:ext cx="0" cy="0"/>
+          <a:chOff x="0" y="0"/>
+          <a:chExt cx="0" cy="0"/>
+        </a:xfrm>
+      </p:grpSpPr>
+      <p:sp>
+        <p:nvSpPr>
+          <p:cNvPr id="2" name="Title 1"/>
+          <p:cNvSpPr>
+            <a:spLocks noGrp="1"/>
+          </p:cNvSpPr>
+          <p:nvPr>
+            <p:ph type="title"/>
+          </p:nvPr>
+        </p:nvSpPr>
+        <p:spPr/>
+        <p:txBody>
+          <a:bodyPr/>
+          <a:lstStyle/>
+          <a:p>
+            <a:r>
+              <a:rPr lang="nb-NO" dirty="0" smtClean="0"/>
+              <a:t>Database </a:t>
+            </a:r>
+            <a:r>
+              <a:rPr lang="nb-NO" dirty="0" err="1" smtClean="0"/>
+              <a:t>delivery</a:t>
+            </a:r>
+            <a:r>
+              <a:rPr lang="nb-NO" dirty="0" smtClean="0"/>
+              <a:t> diff-released.txt</a:t>
+            </a:r>
+            <a:endParaRPr lang="nb-NO" dirty="0"/>
+          </a:p>
+        </p:txBody>
+      </p:sp>
+      <p:sp>
+        <p:nvSpPr>
+          <p:cNvPr id="3" name="Content Placeholder 2"/>
+          <p:cNvSpPr>
+            <a:spLocks noGrp="1"/>
+          </p:cNvSpPr>
+          <p:nvPr>
+            <p:ph idx="1"/>
+          </p:nvPr>
+        </p:nvSpPr>
+        <p:spPr/>
+        <p:txBody>
+          <a:bodyPr/>
+          <a:lstStyle/>
+          <a:p>
+            <a:r>
+              <a:rPr lang="nb-NO" dirty="0" smtClean="0"/>
+              <a:t>Shows </a:t>
+            </a:r>
+            <a:r>
+              <a:rPr lang="nb-NO" dirty="0" err="1" smtClean="0"/>
+              <a:t>diff</a:t>
+            </a:r>
+            <a:r>
+              <a:rPr lang="nb-NO" dirty="0" smtClean="0"/>
+              <a:t> </a:t>
+            </a:r>
+            <a:r>
+              <a:rPr lang="nb-NO" dirty="0" err="1" smtClean="0"/>
+              <a:t>vs</a:t>
+            </a:r>
+            <a:r>
+              <a:rPr lang="nb-NO" dirty="0" smtClean="0"/>
+              <a:t> </a:t>
+            </a:r>
+            <a:r>
+              <a:rPr lang="nb-NO" dirty="0" err="1" smtClean="0"/>
+              <a:t>the</a:t>
+            </a:r>
+            <a:r>
+              <a:rPr lang="nb-NO" dirty="0" smtClean="0"/>
+              <a:t> </a:t>
+            </a:r>
+            <a:r>
+              <a:rPr lang="nb-NO" dirty="0" err="1" smtClean="0"/>
+              <a:t>released</a:t>
+            </a:r>
+            <a:r>
+              <a:rPr lang="nb-NO" dirty="0" smtClean="0"/>
+              <a:t> </a:t>
+            </a:r>
+            <a:r>
+              <a:rPr lang="nb-NO" dirty="0" err="1" smtClean="0"/>
+              <a:t>package</a:t>
+            </a:r>
+            <a:r>
+              <a:rPr lang="nb-NO" dirty="0" smtClean="0"/>
+              <a:t> </a:t>
+            </a:r>
+            <a:r>
+              <a:rPr lang="nb-NO" dirty="0" err="1" smtClean="0"/>
+              <a:t>specified</a:t>
+            </a:r>
+            <a:r>
+              <a:rPr lang="nb-NO" dirty="0" smtClean="0"/>
+              <a:t> in </a:t>
+            </a:r>
+            <a:r>
+              <a:rPr lang="nb-NO" dirty="0" err="1" smtClean="0"/>
+              <a:t>the</a:t>
+            </a:r>
+            <a:r>
+              <a:rPr lang="nb-NO" dirty="0" smtClean="0"/>
+              <a:t> </a:t>
+            </a:r>
+            <a:r>
+              <a:rPr lang="nb-NO" dirty="0" err="1" smtClean="0"/>
+              <a:t>delivery</a:t>
+            </a:r>
+            <a:r>
+              <a:rPr lang="nb-NO" dirty="0" smtClean="0"/>
+              <a:t> </a:t>
+            </a:r>
+            <a:r>
+              <a:rPr lang="nb-NO" dirty="0" err="1" smtClean="0"/>
+              <a:t>configuration</a:t>
+            </a:r>
+            <a:endParaRPr lang="nb-NO" dirty="0" smtClean="0"/>
+          </a:p>
+          <a:p>
+            <a:r>
+              <a:rPr lang="nb-NO" dirty="0" err="1" smtClean="0"/>
+              <a:t>Upgraded</a:t>
+            </a:r>
+            <a:r>
+              <a:rPr lang="nb-NO" dirty="0" smtClean="0"/>
+              <a:t> </a:t>
+            </a:r>
+            <a:r>
+              <a:rPr lang="nb-NO" dirty="0" err="1" smtClean="0"/>
+              <a:t>packages</a:t>
+            </a:r>
+            <a:r>
+              <a:rPr lang="nb-NO" dirty="0" smtClean="0"/>
+              <a:t>: </a:t>
+            </a:r>
+            <a:r>
+              <a:rPr lang="nb-NO" dirty="0" err="1" smtClean="0"/>
+              <a:t>packages</a:t>
+            </a:r>
+            <a:r>
+              <a:rPr lang="nb-NO" dirty="0" smtClean="0"/>
+              <a:t> from 18.1 </a:t>
+            </a:r>
+            <a:r>
+              <a:rPr lang="nb-NO" dirty="0" err="1" smtClean="0"/>
+              <a:t>with</a:t>
+            </a:r>
+            <a:r>
+              <a:rPr lang="nb-NO" dirty="0" smtClean="0"/>
+              <a:t> </a:t>
+            </a:r>
+            <a:r>
+              <a:rPr lang="nb-NO" dirty="0" err="1" smtClean="0"/>
+              <a:t>upgraded</a:t>
+            </a:r>
+            <a:r>
+              <a:rPr lang="nb-NO" dirty="0" smtClean="0"/>
+              <a:t> </a:t>
+            </a:r>
+            <a:r>
+              <a:rPr lang="nb-NO" dirty="0" err="1" smtClean="0"/>
+              <a:t>nugetversion</a:t>
+            </a:r>
+            <a:endParaRPr lang="nb-NO" dirty="0" smtClean="0"/>
+          </a:p>
+          <a:p>
+            <a:r>
+              <a:rPr lang="nb-NO" dirty="0" err="1" smtClean="0"/>
+              <a:t>Added</a:t>
+            </a:r>
+            <a:r>
+              <a:rPr lang="nb-NO" dirty="0" smtClean="0"/>
+              <a:t> </a:t>
+            </a:r>
+            <a:r>
+              <a:rPr lang="nb-NO" dirty="0" err="1" smtClean="0"/>
+              <a:t>packages</a:t>
+            </a:r>
+            <a:r>
+              <a:rPr lang="nb-NO" dirty="0" smtClean="0"/>
+              <a:t>: dips-arena-framework-database-19.1.0</a:t>
+            </a:r>
+          </a:p>
+          <a:p>
+            <a:r>
+              <a:rPr lang="nb-NO" dirty="0" err="1" smtClean="0"/>
+              <a:t>Removed</a:t>
+            </a:r>
+            <a:r>
+              <a:rPr lang="nb-NO" dirty="0" smtClean="0"/>
+              <a:t> </a:t>
+            </a:r>
+            <a:r>
+              <a:rPr lang="nb-NO" dirty="0" err="1" smtClean="0"/>
+              <a:t>packages</a:t>
+            </a:r>
+            <a:r>
+              <a:rPr lang="nb-NO" dirty="0" smtClean="0"/>
+              <a:t>:</a:t>
+            </a:r>
+            <a:endParaRPr lang="nb-NO" dirty="0"/>
+          </a:p>
+        </p:txBody>
+      </p:sp>
+    </p:spTree>
+    <p:extLst>
+      <p:ext uri="{BB962C8B-B14F-4D97-AF65-F5344CB8AC3E}">
+        <p14:creationId xmlns:p14="http://schemas.microsoft.com/office/powerpoint/2010/main" val="1885423006"/>
+      </p:ext>
+    </p:extLst>
+  </p:cSld>
+  <p:clrMapOvr>
+    <a:masterClrMapping/>
+  </p:clrMapOvr>
+</p:sld>
+</file>
+
 <file path=ppt/slides/slide6.xml><?xml version="1.0" encoding="utf-8"?>
 <p:sld xmlns:a="http://schemas.openxmlformats.org/drawingml/2006/main" xmlns:r="http://schemas.openxmlformats.org/officeDocument/2006/relationships" xmlns:p="http://schemas.openxmlformats.org/presentationml/2006/main">
   <p:cSld>
@@ -11913,7 +14232,6 @@
               <a:rPr lang="nb-NO" dirty="0"/>
               <a:t>Chocolatey Software, Inc.</a:t>
             </a:r>
-            <a:endParaRPr lang="nb-NO" dirty="0"/>
           </a:p>
         </p:txBody>
       </p:sp>

</xml_diff>